<commit_message>
Updated GHC7 map and waypoints
</commit_message>
<xml_diff>
--- a/XPlanningEvaluation/data/GHC7-map.pptx
+++ b/XPlanningEvaluation/data/GHC7-map.pptx
@@ -228,7 +228,7 @@
           <a:p>
             <a:fld id="{889A91B8-F24B-9C43-8490-2074FD638EA6}" type="datetimeFigureOut">
               <a:rPr lang="en-US" smtClean="0"/>
-              <a:t>3/6/19</a:t>
+              <a:t>3/12/19</a:t>
             </a:fld>
             <a:endParaRPr lang="en-US"/>
           </a:p>
@@ -642,7 +642,7 @@
           <a:p>
             <a:fld id="{D68A46D0-B6E8-BC44-9D05-558D4CF9F544}" type="datetimeFigureOut">
               <a:rPr lang="en-US" smtClean="0"/>
-              <a:t>3/6/19</a:t>
+              <a:t>3/12/19</a:t>
             </a:fld>
             <a:endParaRPr lang="en-US"/>
           </a:p>
@@ -840,7 +840,7 @@
           <a:p>
             <a:fld id="{D68A46D0-B6E8-BC44-9D05-558D4CF9F544}" type="datetimeFigureOut">
               <a:rPr lang="en-US" smtClean="0"/>
-              <a:t>3/6/19</a:t>
+              <a:t>3/12/19</a:t>
             </a:fld>
             <a:endParaRPr lang="en-US"/>
           </a:p>
@@ -1048,7 +1048,7 @@
           <a:p>
             <a:fld id="{D68A46D0-B6E8-BC44-9D05-558D4CF9F544}" type="datetimeFigureOut">
               <a:rPr lang="en-US" smtClean="0"/>
-              <a:t>3/6/19</a:t>
+              <a:t>3/12/19</a:t>
             </a:fld>
             <a:endParaRPr lang="en-US"/>
           </a:p>
@@ -1246,7 +1246,7 @@
           <a:p>
             <a:fld id="{D68A46D0-B6E8-BC44-9D05-558D4CF9F544}" type="datetimeFigureOut">
               <a:rPr lang="en-US" smtClean="0"/>
-              <a:t>3/6/19</a:t>
+              <a:t>3/12/19</a:t>
             </a:fld>
             <a:endParaRPr lang="en-US"/>
           </a:p>
@@ -1521,7 +1521,7 @@
           <a:p>
             <a:fld id="{D68A46D0-B6E8-BC44-9D05-558D4CF9F544}" type="datetimeFigureOut">
               <a:rPr lang="en-US" smtClean="0"/>
-              <a:t>3/6/19</a:t>
+              <a:t>3/12/19</a:t>
             </a:fld>
             <a:endParaRPr lang="en-US"/>
           </a:p>
@@ -1786,7 +1786,7 @@
           <a:p>
             <a:fld id="{D68A46D0-B6E8-BC44-9D05-558D4CF9F544}" type="datetimeFigureOut">
               <a:rPr lang="en-US" smtClean="0"/>
-              <a:t>3/6/19</a:t>
+              <a:t>3/12/19</a:t>
             </a:fld>
             <a:endParaRPr lang="en-US"/>
           </a:p>
@@ -2198,7 +2198,7 @@
           <a:p>
             <a:fld id="{D68A46D0-B6E8-BC44-9D05-558D4CF9F544}" type="datetimeFigureOut">
               <a:rPr lang="en-US" smtClean="0"/>
-              <a:t>3/6/19</a:t>
+              <a:t>3/12/19</a:t>
             </a:fld>
             <a:endParaRPr lang="en-US"/>
           </a:p>
@@ -2339,7 +2339,7 @@
           <a:p>
             <a:fld id="{D68A46D0-B6E8-BC44-9D05-558D4CF9F544}" type="datetimeFigureOut">
               <a:rPr lang="en-US" smtClean="0"/>
-              <a:t>3/6/19</a:t>
+              <a:t>3/12/19</a:t>
             </a:fld>
             <a:endParaRPr lang="en-US"/>
           </a:p>
@@ -2452,7 +2452,7 @@
           <a:p>
             <a:fld id="{D68A46D0-B6E8-BC44-9D05-558D4CF9F544}" type="datetimeFigureOut">
               <a:rPr lang="en-US" smtClean="0"/>
-              <a:t>3/6/19</a:t>
+              <a:t>3/12/19</a:t>
             </a:fld>
             <a:endParaRPr lang="en-US"/>
           </a:p>
@@ -2763,7 +2763,7 @@
           <a:p>
             <a:fld id="{D68A46D0-B6E8-BC44-9D05-558D4CF9F544}" type="datetimeFigureOut">
               <a:rPr lang="en-US" smtClean="0"/>
-              <a:t>3/6/19</a:t>
+              <a:t>3/12/19</a:t>
             </a:fld>
             <a:endParaRPr lang="en-US"/>
           </a:p>
@@ -3051,7 +3051,7 @@
           <a:p>
             <a:fld id="{D68A46D0-B6E8-BC44-9D05-558D4CF9F544}" type="datetimeFigureOut">
               <a:rPr lang="en-US" smtClean="0"/>
-              <a:t>3/6/19</a:t>
+              <a:t>3/12/19</a:t>
             </a:fld>
             <a:endParaRPr lang="en-US"/>
           </a:p>
@@ -3292,7 +3292,7 @@
           <a:p>
             <a:fld id="{D68A46D0-B6E8-BC44-9D05-558D4CF9F544}" type="datetimeFigureOut">
               <a:rPr lang="en-US" smtClean="0"/>
-              <a:t>3/6/19</a:t>
+              <a:t>3/12/19</a:t>
             </a:fld>
             <a:endParaRPr lang="en-US"/>
           </a:p>
@@ -6356,6 +6356,47 @@
           </a:p>
         </p:txBody>
       </p:sp>
+      <p:cxnSp>
+        <p:nvCxnSpPr>
+          <p:cNvPr id="13" name="Straight Connector 12">
+            <a:extLst>
+              <a:ext uri="{FF2B5EF4-FFF2-40B4-BE49-F238E27FC236}">
+                <a16:creationId xmlns:a16="http://schemas.microsoft.com/office/drawing/2014/main" id="{C311B2DC-C053-F44C-BEED-06B329BC825D}"/>
+              </a:ext>
+            </a:extLst>
+          </p:cNvPr>
+          <p:cNvCxnSpPr>
+            <a:cxnSpLocks/>
+            <a:stCxn id="39" idx="6"/>
+            <a:endCxn id="25" idx="2"/>
+          </p:cNvCxnSpPr>
+          <p:nvPr/>
+        </p:nvCxnSpPr>
+        <p:spPr>
+          <a:xfrm>
+            <a:off x="5108042" y="3541268"/>
+            <a:ext cx="150940" cy="179261"/>
+          </a:xfrm>
+          <a:prstGeom prst="line">
+            <a:avLst/>
+          </a:prstGeom>
+          <a:ln w="19050"/>
+        </p:spPr>
+        <p:style>
+          <a:lnRef idx="1">
+            <a:schemeClr val="accent1"/>
+          </a:lnRef>
+          <a:fillRef idx="0">
+            <a:schemeClr val="accent1"/>
+          </a:fillRef>
+          <a:effectRef idx="0">
+            <a:schemeClr val="accent1"/>
+          </a:effectRef>
+          <a:fontRef idx="minor">
+            <a:schemeClr val="tx1"/>
+          </a:fontRef>
+        </p:style>
+      </p:cxnSp>
     </p:spTree>
     <p:extLst>
       <p:ext uri="{BB962C8B-B14F-4D97-AF65-F5344CB8AC3E}">

</xml_diff>

<commit_message>
Added additional way-points X1-5 to GHC7-map.pptx and GHC7-waypoints.xlsx
</commit_message>
<xml_diff>
--- a/XPlanningEvaluation/data/GHC7-map.pptx
+++ b/XPlanningEvaluation/data/GHC7-map.pptx
@@ -5,16 +5,17 @@
     <p:sldMasterId id="2147483648" r:id="rId1"/>
   </p:sldMasterIdLst>
   <p:notesMasterIdLst>
-    <p:notesMasterId r:id="rId9"/>
+    <p:notesMasterId r:id="rId10"/>
   </p:notesMasterIdLst>
   <p:sldIdLst>
     <p:sldId id="265" r:id="rId2"/>
     <p:sldId id="271" r:id="rId3"/>
-    <p:sldId id="268" r:id="rId4"/>
-    <p:sldId id="269" r:id="rId5"/>
-    <p:sldId id="266" r:id="rId6"/>
-    <p:sldId id="259" r:id="rId7"/>
-    <p:sldId id="262" r:id="rId8"/>
+    <p:sldId id="272" r:id="rId4"/>
+    <p:sldId id="268" r:id="rId5"/>
+    <p:sldId id="269" r:id="rId6"/>
+    <p:sldId id="266" r:id="rId7"/>
+    <p:sldId id="259" r:id="rId8"/>
+    <p:sldId id="262" r:id="rId9"/>
   </p:sldIdLst>
   <p:sldSz cx="12192000" cy="6858000"/>
   <p:notesSz cx="6858000" cy="9144000"/>
@@ -228,7 +229,7 @@
           <a:p>
             <a:fld id="{889A91B8-F24B-9C43-8490-2074FD638EA6}" type="datetimeFigureOut">
               <a:rPr lang="en-US" smtClean="0"/>
-              <a:t>3/12/19</a:t>
+              <a:t>4/24/19</a:t>
             </a:fld>
             <a:endParaRPr lang="en-US"/>
           </a:p>
@@ -642,7 +643,7 @@
           <a:p>
             <a:fld id="{D68A46D0-B6E8-BC44-9D05-558D4CF9F544}" type="datetimeFigureOut">
               <a:rPr lang="en-US" smtClean="0"/>
-              <a:t>3/12/19</a:t>
+              <a:t>4/24/19</a:t>
             </a:fld>
             <a:endParaRPr lang="en-US"/>
           </a:p>
@@ -840,7 +841,7 @@
           <a:p>
             <a:fld id="{D68A46D0-B6E8-BC44-9D05-558D4CF9F544}" type="datetimeFigureOut">
               <a:rPr lang="en-US" smtClean="0"/>
-              <a:t>3/12/19</a:t>
+              <a:t>4/24/19</a:t>
             </a:fld>
             <a:endParaRPr lang="en-US"/>
           </a:p>
@@ -1048,7 +1049,7 @@
           <a:p>
             <a:fld id="{D68A46D0-B6E8-BC44-9D05-558D4CF9F544}" type="datetimeFigureOut">
               <a:rPr lang="en-US" smtClean="0"/>
-              <a:t>3/12/19</a:t>
+              <a:t>4/24/19</a:t>
             </a:fld>
             <a:endParaRPr lang="en-US"/>
           </a:p>
@@ -1246,7 +1247,7 @@
           <a:p>
             <a:fld id="{D68A46D0-B6E8-BC44-9D05-558D4CF9F544}" type="datetimeFigureOut">
               <a:rPr lang="en-US" smtClean="0"/>
-              <a:t>3/12/19</a:t>
+              <a:t>4/24/19</a:t>
             </a:fld>
             <a:endParaRPr lang="en-US"/>
           </a:p>
@@ -1521,7 +1522,7 @@
           <a:p>
             <a:fld id="{D68A46D0-B6E8-BC44-9D05-558D4CF9F544}" type="datetimeFigureOut">
               <a:rPr lang="en-US" smtClean="0"/>
-              <a:t>3/12/19</a:t>
+              <a:t>4/24/19</a:t>
             </a:fld>
             <a:endParaRPr lang="en-US"/>
           </a:p>
@@ -1786,7 +1787,7 @@
           <a:p>
             <a:fld id="{D68A46D0-B6E8-BC44-9D05-558D4CF9F544}" type="datetimeFigureOut">
               <a:rPr lang="en-US" smtClean="0"/>
-              <a:t>3/12/19</a:t>
+              <a:t>4/24/19</a:t>
             </a:fld>
             <a:endParaRPr lang="en-US"/>
           </a:p>
@@ -2198,7 +2199,7 @@
           <a:p>
             <a:fld id="{D68A46D0-B6E8-BC44-9D05-558D4CF9F544}" type="datetimeFigureOut">
               <a:rPr lang="en-US" smtClean="0"/>
-              <a:t>3/12/19</a:t>
+              <a:t>4/24/19</a:t>
             </a:fld>
             <a:endParaRPr lang="en-US"/>
           </a:p>
@@ -2339,7 +2340,7 @@
           <a:p>
             <a:fld id="{D68A46D0-B6E8-BC44-9D05-558D4CF9F544}" type="datetimeFigureOut">
               <a:rPr lang="en-US" smtClean="0"/>
-              <a:t>3/12/19</a:t>
+              <a:t>4/24/19</a:t>
             </a:fld>
             <a:endParaRPr lang="en-US"/>
           </a:p>
@@ -2452,7 +2453,7 @@
           <a:p>
             <a:fld id="{D68A46D0-B6E8-BC44-9D05-558D4CF9F544}" type="datetimeFigureOut">
               <a:rPr lang="en-US" smtClean="0"/>
-              <a:t>3/12/19</a:t>
+              <a:t>4/24/19</a:t>
             </a:fld>
             <a:endParaRPr lang="en-US"/>
           </a:p>
@@ -2763,7 +2764,7 @@
           <a:p>
             <a:fld id="{D68A46D0-B6E8-BC44-9D05-558D4CF9F544}" type="datetimeFigureOut">
               <a:rPr lang="en-US" smtClean="0"/>
-              <a:t>3/12/19</a:t>
+              <a:t>4/24/19</a:t>
             </a:fld>
             <a:endParaRPr lang="en-US"/>
           </a:p>
@@ -3051,7 +3052,7 @@
           <a:p>
             <a:fld id="{D68A46D0-B6E8-BC44-9D05-558D4CF9F544}" type="datetimeFigureOut">
               <a:rPr lang="en-US" smtClean="0"/>
-              <a:t>3/12/19</a:t>
+              <a:t>4/24/19</a:t>
             </a:fld>
             <a:endParaRPr lang="en-US"/>
           </a:p>
@@ -3292,7 +3293,7 @@
           <a:p>
             <a:fld id="{D68A46D0-B6E8-BC44-9D05-558D4CF9F544}" type="datetimeFigureOut">
               <a:rPr lang="en-US" smtClean="0"/>
-              <a:t>3/12/19</a:t>
+              <a:t>4/24/19</a:t>
             </a:fld>
             <a:endParaRPr lang="en-US"/>
           </a:p>
@@ -6429,6 +6430,3302 @@
       </p:grpSpPr>
       <p:pic>
         <p:nvPicPr>
+          <p:cNvPr id="2" name="Picture 1" descr="A close up of a map&#10;&#10;Description automatically generated">
+            <a:extLst>
+              <a:ext uri="{FF2B5EF4-FFF2-40B4-BE49-F238E27FC236}">
+                <a16:creationId xmlns:a16="http://schemas.microsoft.com/office/drawing/2014/main" id="{E52CA7C2-B77E-DC45-95D1-6DEB08A4108D}"/>
+              </a:ext>
+            </a:extLst>
+          </p:cNvPr>
+          <p:cNvPicPr>
+            <a:picLocks noChangeAspect="1"/>
+          </p:cNvPicPr>
+          <p:nvPr/>
+        </p:nvPicPr>
+        <p:blipFill>
+          <a:blip r:embed="rId2">
+            <a:alphaModFix amt="80000"/>
+          </a:blip>
+          <a:stretch>
+            <a:fillRect/>
+          </a:stretch>
+        </p:blipFill>
+        <p:spPr>
+          <a:xfrm>
+            <a:off x="4014107" y="0"/>
+            <a:ext cx="4163786" cy="6858000"/>
+          </a:xfrm>
+          <a:prstGeom prst="rect">
+            <a:avLst/>
+          </a:prstGeom>
+        </p:spPr>
+      </p:pic>
+      <p:sp>
+        <p:nvSpPr>
+          <p:cNvPr id="4" name="TextBox 3">
+            <a:extLst>
+              <a:ext uri="{FF2B5EF4-FFF2-40B4-BE49-F238E27FC236}">
+                <a16:creationId xmlns:a16="http://schemas.microsoft.com/office/drawing/2014/main" id="{766C0B05-3743-6343-8AB5-BA709539F3CE}"/>
+              </a:ext>
+            </a:extLst>
+          </p:cNvPr>
+          <p:cNvSpPr txBox="1"/>
+          <p:nvPr/>
+        </p:nvSpPr>
+        <p:spPr>
+          <a:xfrm>
+            <a:off x="431800" y="685800"/>
+            <a:ext cx="3545394" cy="369332"/>
+          </a:xfrm>
+          <a:prstGeom prst="rect">
+            <a:avLst/>
+          </a:prstGeom>
+          <a:noFill/>
+        </p:spPr>
+        <p:txBody>
+          <a:bodyPr wrap="none" rtlCol="0">
+            <a:spAutoFit/>
+          </a:bodyPr>
+          <a:lstStyle/>
+          <a:p>
+            <a:r>
+              <a:rPr lang="en-US" dirty="0"/>
+              <a:t>Image + map topology (augmented)</a:t>
+            </a:r>
+          </a:p>
+        </p:txBody>
+      </p:sp>
+      <p:sp>
+        <p:nvSpPr>
+          <p:cNvPr id="26" name="Oval 25">
+            <a:extLst>
+              <a:ext uri="{FF2B5EF4-FFF2-40B4-BE49-F238E27FC236}">
+                <a16:creationId xmlns:a16="http://schemas.microsoft.com/office/drawing/2014/main" id="{E812E9C0-03AF-DA41-9689-91E4453DB3A4}"/>
+              </a:ext>
+            </a:extLst>
+          </p:cNvPr>
+          <p:cNvSpPr>
+            <a:spLocks noChangeAspect="1"/>
+          </p:cNvSpPr>
+          <p:nvPr/>
+        </p:nvSpPr>
+        <p:spPr>
+          <a:xfrm>
+            <a:off x="5167542" y="4020653"/>
+            <a:ext cx="182880" cy="182880"/>
+          </a:xfrm>
+          <a:prstGeom prst="ellipse">
+            <a:avLst/>
+          </a:prstGeom>
+          <a:ln>
+            <a:noFill/>
+          </a:ln>
+        </p:spPr>
+        <p:style>
+          <a:lnRef idx="2">
+            <a:schemeClr val="accent1">
+              <a:shade val="50000"/>
+            </a:schemeClr>
+          </a:lnRef>
+          <a:fillRef idx="1">
+            <a:schemeClr val="accent1"/>
+          </a:fillRef>
+          <a:effectRef idx="0">
+            <a:schemeClr val="accent1"/>
+          </a:effectRef>
+          <a:fontRef idx="minor">
+            <a:schemeClr val="lt1"/>
+          </a:fontRef>
+        </p:style>
+        <p:txBody>
+          <a:bodyPr rtlCol="0" anchor="ctr"/>
+          <a:lstStyle/>
+          <a:p>
+            <a:pPr algn="ctr"/>
+            <a:r>
+              <a:rPr lang="en-US" sz="800" dirty="0"/>
+              <a:t>23</a:t>
+            </a:r>
+          </a:p>
+        </p:txBody>
+      </p:sp>
+      <p:sp>
+        <p:nvSpPr>
+          <p:cNvPr id="31" name="Oval 30">
+            <a:extLst>
+              <a:ext uri="{FF2B5EF4-FFF2-40B4-BE49-F238E27FC236}">
+                <a16:creationId xmlns:a16="http://schemas.microsoft.com/office/drawing/2014/main" id="{F271BBD8-CC18-894B-A412-31EE6B3B68CD}"/>
+              </a:ext>
+            </a:extLst>
+          </p:cNvPr>
+          <p:cNvSpPr>
+            <a:spLocks noChangeAspect="1"/>
+          </p:cNvSpPr>
+          <p:nvPr/>
+        </p:nvSpPr>
+        <p:spPr>
+          <a:xfrm>
+            <a:off x="6174431" y="3811969"/>
+            <a:ext cx="182880" cy="182880"/>
+          </a:xfrm>
+          <a:prstGeom prst="ellipse">
+            <a:avLst/>
+          </a:prstGeom>
+          <a:ln>
+            <a:noFill/>
+          </a:ln>
+        </p:spPr>
+        <p:style>
+          <a:lnRef idx="2">
+            <a:schemeClr val="accent1">
+              <a:shade val="50000"/>
+            </a:schemeClr>
+          </a:lnRef>
+          <a:fillRef idx="1">
+            <a:schemeClr val="accent1"/>
+          </a:fillRef>
+          <a:effectRef idx="0">
+            <a:schemeClr val="accent1"/>
+          </a:effectRef>
+          <a:fontRef idx="minor">
+            <a:schemeClr val="lt1"/>
+          </a:fontRef>
+        </p:style>
+        <p:txBody>
+          <a:bodyPr rtlCol="0" anchor="ctr"/>
+          <a:lstStyle/>
+          <a:p>
+            <a:pPr algn="ctr"/>
+            <a:r>
+              <a:rPr lang="en-US" sz="800" dirty="0"/>
+              <a:t>25</a:t>
+            </a:r>
+          </a:p>
+        </p:txBody>
+      </p:sp>
+      <p:sp>
+        <p:nvSpPr>
+          <p:cNvPr id="32" name="Oval 31">
+            <a:extLst>
+              <a:ext uri="{FF2B5EF4-FFF2-40B4-BE49-F238E27FC236}">
+                <a16:creationId xmlns:a16="http://schemas.microsoft.com/office/drawing/2014/main" id="{253A1E68-7E1E-CD4F-ABFD-4F4866618544}"/>
+              </a:ext>
+            </a:extLst>
+          </p:cNvPr>
+          <p:cNvSpPr>
+            <a:spLocks noChangeAspect="1"/>
+          </p:cNvSpPr>
+          <p:nvPr/>
+        </p:nvSpPr>
+        <p:spPr>
+          <a:xfrm>
+            <a:off x="6202675" y="3407108"/>
+            <a:ext cx="182880" cy="182880"/>
+          </a:xfrm>
+          <a:prstGeom prst="ellipse">
+            <a:avLst/>
+          </a:prstGeom>
+          <a:ln>
+            <a:noFill/>
+          </a:ln>
+        </p:spPr>
+        <p:style>
+          <a:lnRef idx="2">
+            <a:schemeClr val="accent1">
+              <a:shade val="50000"/>
+            </a:schemeClr>
+          </a:lnRef>
+          <a:fillRef idx="1">
+            <a:schemeClr val="accent1"/>
+          </a:fillRef>
+          <a:effectRef idx="0">
+            <a:schemeClr val="accent1"/>
+          </a:effectRef>
+          <a:fontRef idx="minor">
+            <a:schemeClr val="lt1"/>
+          </a:fontRef>
+        </p:style>
+        <p:txBody>
+          <a:bodyPr rtlCol="0" anchor="ctr"/>
+          <a:lstStyle/>
+          <a:p>
+            <a:pPr algn="ctr"/>
+            <a:r>
+              <a:rPr lang="en-US" sz="800" dirty="0"/>
+              <a:t>21</a:t>
+            </a:r>
+          </a:p>
+        </p:txBody>
+      </p:sp>
+      <p:sp>
+        <p:nvSpPr>
+          <p:cNvPr id="34" name="Oval 33">
+            <a:extLst>
+              <a:ext uri="{FF2B5EF4-FFF2-40B4-BE49-F238E27FC236}">
+                <a16:creationId xmlns:a16="http://schemas.microsoft.com/office/drawing/2014/main" id="{B4F6F0A9-6C12-1945-8469-5E89320C51E3}"/>
+              </a:ext>
+            </a:extLst>
+          </p:cNvPr>
+          <p:cNvSpPr>
+            <a:spLocks noChangeAspect="1"/>
+          </p:cNvSpPr>
+          <p:nvPr/>
+        </p:nvSpPr>
+        <p:spPr>
+          <a:xfrm>
+            <a:off x="5789649" y="4881197"/>
+            <a:ext cx="182880" cy="182880"/>
+          </a:xfrm>
+          <a:prstGeom prst="ellipse">
+            <a:avLst/>
+          </a:prstGeom>
+          <a:ln>
+            <a:noFill/>
+          </a:ln>
+        </p:spPr>
+        <p:style>
+          <a:lnRef idx="2">
+            <a:schemeClr val="accent1">
+              <a:shade val="50000"/>
+            </a:schemeClr>
+          </a:lnRef>
+          <a:fillRef idx="1">
+            <a:schemeClr val="accent1"/>
+          </a:fillRef>
+          <a:effectRef idx="0">
+            <a:schemeClr val="accent1"/>
+          </a:effectRef>
+          <a:fontRef idx="minor">
+            <a:schemeClr val="lt1"/>
+          </a:fontRef>
+        </p:style>
+        <p:txBody>
+          <a:bodyPr rtlCol="0" anchor="ctr"/>
+          <a:lstStyle/>
+          <a:p>
+            <a:pPr algn="ctr"/>
+            <a:r>
+              <a:rPr lang="en-US" sz="800" dirty="0"/>
+              <a:t>28</a:t>
+            </a:r>
+          </a:p>
+        </p:txBody>
+      </p:sp>
+      <p:sp>
+        <p:nvSpPr>
+          <p:cNvPr id="36" name="Oval 35">
+            <a:extLst>
+              <a:ext uri="{FF2B5EF4-FFF2-40B4-BE49-F238E27FC236}">
+                <a16:creationId xmlns:a16="http://schemas.microsoft.com/office/drawing/2014/main" id="{A8B9A1FE-16BA-064B-A237-D66DB3BE6810}"/>
+              </a:ext>
+            </a:extLst>
+          </p:cNvPr>
+          <p:cNvSpPr>
+            <a:spLocks noChangeAspect="1"/>
+          </p:cNvSpPr>
+          <p:nvPr/>
+        </p:nvSpPr>
+        <p:spPr>
+          <a:xfrm>
+            <a:off x="5748416" y="5861777"/>
+            <a:ext cx="182880" cy="182880"/>
+          </a:xfrm>
+          <a:prstGeom prst="ellipse">
+            <a:avLst/>
+          </a:prstGeom>
+          <a:ln>
+            <a:noFill/>
+          </a:ln>
+        </p:spPr>
+        <p:style>
+          <a:lnRef idx="2">
+            <a:schemeClr val="accent1">
+              <a:shade val="50000"/>
+            </a:schemeClr>
+          </a:lnRef>
+          <a:fillRef idx="1">
+            <a:schemeClr val="accent1"/>
+          </a:fillRef>
+          <a:effectRef idx="0">
+            <a:schemeClr val="accent1"/>
+          </a:effectRef>
+          <a:fontRef idx="minor">
+            <a:schemeClr val="lt1"/>
+          </a:fontRef>
+        </p:style>
+        <p:txBody>
+          <a:bodyPr rtlCol="0" anchor="ctr"/>
+          <a:lstStyle/>
+          <a:p>
+            <a:pPr algn="ctr"/>
+            <a:r>
+              <a:rPr lang="en-US" sz="800" dirty="0"/>
+              <a:t>30</a:t>
+            </a:r>
+          </a:p>
+        </p:txBody>
+      </p:sp>
+      <p:sp>
+        <p:nvSpPr>
+          <p:cNvPr id="38" name="Oval 37">
+            <a:extLst>
+              <a:ext uri="{FF2B5EF4-FFF2-40B4-BE49-F238E27FC236}">
+                <a16:creationId xmlns:a16="http://schemas.microsoft.com/office/drawing/2014/main" id="{7679BF81-B815-134B-83A3-40351512715F}"/>
+              </a:ext>
+            </a:extLst>
+          </p:cNvPr>
+          <p:cNvSpPr>
+            <a:spLocks noChangeAspect="1"/>
+          </p:cNvSpPr>
+          <p:nvPr/>
+        </p:nvSpPr>
+        <p:spPr>
+          <a:xfrm>
+            <a:off x="6732250" y="5639643"/>
+            <a:ext cx="182880" cy="182880"/>
+          </a:xfrm>
+          <a:prstGeom prst="ellipse">
+            <a:avLst/>
+          </a:prstGeom>
+          <a:ln>
+            <a:noFill/>
+          </a:ln>
+        </p:spPr>
+        <p:style>
+          <a:lnRef idx="2">
+            <a:schemeClr val="accent1">
+              <a:shade val="50000"/>
+            </a:schemeClr>
+          </a:lnRef>
+          <a:fillRef idx="1">
+            <a:schemeClr val="accent1"/>
+          </a:fillRef>
+          <a:effectRef idx="0">
+            <a:schemeClr val="accent1"/>
+          </a:effectRef>
+          <a:fontRef idx="minor">
+            <a:schemeClr val="lt1"/>
+          </a:fontRef>
+        </p:style>
+        <p:txBody>
+          <a:bodyPr rtlCol="0" anchor="ctr"/>
+          <a:lstStyle/>
+          <a:p>
+            <a:pPr algn="ctr"/>
+            <a:r>
+              <a:rPr lang="en-US" sz="800" dirty="0"/>
+              <a:t>32</a:t>
+            </a:r>
+          </a:p>
+        </p:txBody>
+      </p:sp>
+      <p:sp>
+        <p:nvSpPr>
+          <p:cNvPr id="39" name="Oval 38">
+            <a:extLst>
+              <a:ext uri="{FF2B5EF4-FFF2-40B4-BE49-F238E27FC236}">
+                <a16:creationId xmlns:a16="http://schemas.microsoft.com/office/drawing/2014/main" id="{705B4884-9C12-484A-9D87-7F6C11D5433C}"/>
+              </a:ext>
+            </a:extLst>
+          </p:cNvPr>
+          <p:cNvSpPr>
+            <a:spLocks noChangeAspect="1"/>
+          </p:cNvSpPr>
+          <p:nvPr/>
+        </p:nvSpPr>
+        <p:spPr>
+          <a:xfrm>
+            <a:off x="4925162" y="3449828"/>
+            <a:ext cx="182880" cy="182880"/>
+          </a:xfrm>
+          <a:prstGeom prst="ellipse">
+            <a:avLst/>
+          </a:prstGeom>
+          <a:ln>
+            <a:noFill/>
+          </a:ln>
+        </p:spPr>
+        <p:style>
+          <a:lnRef idx="2">
+            <a:schemeClr val="accent1">
+              <a:shade val="50000"/>
+            </a:schemeClr>
+          </a:lnRef>
+          <a:fillRef idx="1">
+            <a:schemeClr val="accent1"/>
+          </a:fillRef>
+          <a:effectRef idx="0">
+            <a:schemeClr val="accent1"/>
+          </a:effectRef>
+          <a:fontRef idx="minor">
+            <a:schemeClr val="lt1"/>
+          </a:fontRef>
+        </p:style>
+        <p:txBody>
+          <a:bodyPr rtlCol="0" anchor="ctr"/>
+          <a:lstStyle/>
+          <a:p>
+            <a:pPr algn="ctr"/>
+            <a:r>
+              <a:rPr lang="en-US" sz="800" dirty="0"/>
+              <a:t>19</a:t>
+            </a:r>
+          </a:p>
+        </p:txBody>
+      </p:sp>
+      <p:cxnSp>
+        <p:nvCxnSpPr>
+          <p:cNvPr id="55" name="Straight Connector 54">
+            <a:extLst>
+              <a:ext uri="{FF2B5EF4-FFF2-40B4-BE49-F238E27FC236}">
+                <a16:creationId xmlns:a16="http://schemas.microsoft.com/office/drawing/2014/main" id="{BC2AD5BD-FA31-464C-96FC-EEB692155D46}"/>
+              </a:ext>
+            </a:extLst>
+          </p:cNvPr>
+          <p:cNvCxnSpPr>
+            <a:cxnSpLocks/>
+          </p:cNvCxnSpPr>
+          <p:nvPr/>
+        </p:nvCxnSpPr>
+        <p:spPr>
+          <a:xfrm flipV="1">
+            <a:off x="5097162" y="548991"/>
+            <a:ext cx="1873941" cy="503636"/>
+          </a:xfrm>
+          <a:prstGeom prst="line">
+            <a:avLst/>
+          </a:prstGeom>
+          <a:ln w="19050"/>
+        </p:spPr>
+        <p:style>
+          <a:lnRef idx="1">
+            <a:schemeClr val="accent1"/>
+          </a:lnRef>
+          <a:fillRef idx="0">
+            <a:schemeClr val="accent1"/>
+          </a:fillRef>
+          <a:effectRef idx="0">
+            <a:schemeClr val="accent1"/>
+          </a:effectRef>
+          <a:fontRef idx="minor">
+            <a:schemeClr val="tx1"/>
+          </a:fontRef>
+        </p:style>
+      </p:cxnSp>
+      <p:cxnSp>
+        <p:nvCxnSpPr>
+          <p:cNvPr id="61" name="Straight Connector 60">
+            <a:extLst>
+              <a:ext uri="{FF2B5EF4-FFF2-40B4-BE49-F238E27FC236}">
+                <a16:creationId xmlns:a16="http://schemas.microsoft.com/office/drawing/2014/main" id="{763C3CDB-7E39-CB41-A2BD-5DBF986A1401}"/>
+              </a:ext>
+            </a:extLst>
+          </p:cNvPr>
+          <p:cNvCxnSpPr>
+            <a:cxnSpLocks/>
+          </p:cNvCxnSpPr>
+          <p:nvPr/>
+        </p:nvCxnSpPr>
+        <p:spPr>
+          <a:xfrm>
+            <a:off x="7062543" y="613301"/>
+            <a:ext cx="103179" cy="947423"/>
+          </a:xfrm>
+          <a:prstGeom prst="line">
+            <a:avLst/>
+          </a:prstGeom>
+          <a:ln w="19050"/>
+        </p:spPr>
+        <p:style>
+          <a:lnRef idx="1">
+            <a:schemeClr val="accent1"/>
+          </a:lnRef>
+          <a:fillRef idx="0">
+            <a:schemeClr val="accent1"/>
+          </a:fillRef>
+          <a:effectRef idx="0">
+            <a:schemeClr val="accent1"/>
+          </a:effectRef>
+          <a:fontRef idx="minor">
+            <a:schemeClr val="tx1"/>
+          </a:fontRef>
+        </p:style>
+      </p:cxnSp>
+      <p:cxnSp>
+        <p:nvCxnSpPr>
+          <p:cNvPr id="64" name="Straight Connector 63">
+            <a:extLst>
+              <a:ext uri="{FF2B5EF4-FFF2-40B4-BE49-F238E27FC236}">
+                <a16:creationId xmlns:a16="http://schemas.microsoft.com/office/drawing/2014/main" id="{82ED77E3-E732-4344-9A48-9AEEB5A880D7}"/>
+              </a:ext>
+            </a:extLst>
+          </p:cNvPr>
+          <p:cNvCxnSpPr>
+            <a:cxnSpLocks/>
+            <a:stCxn id="7" idx="4"/>
+          </p:cNvCxnSpPr>
+          <p:nvPr/>
+        </p:nvCxnSpPr>
+        <p:spPr>
+          <a:xfrm flipH="1">
+            <a:off x="6508887" y="748338"/>
+            <a:ext cx="55944" cy="812386"/>
+          </a:xfrm>
+          <a:prstGeom prst="line">
+            <a:avLst/>
+          </a:prstGeom>
+          <a:ln w="19050"/>
+        </p:spPr>
+        <p:style>
+          <a:lnRef idx="1">
+            <a:schemeClr val="accent1"/>
+          </a:lnRef>
+          <a:fillRef idx="0">
+            <a:schemeClr val="accent1"/>
+          </a:fillRef>
+          <a:effectRef idx="0">
+            <a:schemeClr val="accent1"/>
+          </a:effectRef>
+          <a:fontRef idx="minor">
+            <a:schemeClr val="tx1"/>
+          </a:fontRef>
+        </p:style>
+      </p:cxnSp>
+      <p:cxnSp>
+        <p:nvCxnSpPr>
+          <p:cNvPr id="67" name="Straight Connector 66">
+            <a:extLst>
+              <a:ext uri="{FF2B5EF4-FFF2-40B4-BE49-F238E27FC236}">
+                <a16:creationId xmlns:a16="http://schemas.microsoft.com/office/drawing/2014/main" id="{65B60574-603F-8C41-8D6B-D1CA691B3B33}"/>
+              </a:ext>
+            </a:extLst>
+          </p:cNvPr>
+          <p:cNvCxnSpPr>
+            <a:stCxn id="5" idx="4"/>
+            <a:endCxn id="16" idx="0"/>
+          </p:cNvCxnSpPr>
+          <p:nvPr/>
+        </p:nvCxnSpPr>
+        <p:spPr>
+          <a:xfrm flipH="1">
+            <a:off x="5258982" y="1078510"/>
+            <a:ext cx="44202" cy="390774"/>
+          </a:xfrm>
+          <a:prstGeom prst="line">
+            <a:avLst/>
+          </a:prstGeom>
+          <a:ln w="19050"/>
+        </p:spPr>
+        <p:style>
+          <a:lnRef idx="1">
+            <a:schemeClr val="accent1"/>
+          </a:lnRef>
+          <a:fillRef idx="0">
+            <a:schemeClr val="accent1"/>
+          </a:fillRef>
+          <a:effectRef idx="0">
+            <a:schemeClr val="accent1"/>
+          </a:effectRef>
+          <a:fontRef idx="minor">
+            <a:schemeClr val="tx1"/>
+          </a:fontRef>
+        </p:style>
+      </p:cxnSp>
+      <p:cxnSp>
+        <p:nvCxnSpPr>
+          <p:cNvPr id="69" name="Straight Connector 68">
+            <a:extLst>
+              <a:ext uri="{FF2B5EF4-FFF2-40B4-BE49-F238E27FC236}">
+                <a16:creationId xmlns:a16="http://schemas.microsoft.com/office/drawing/2014/main" id="{FD6A3538-41CD-AE42-899D-A80DB42E901E}"/>
+              </a:ext>
+            </a:extLst>
+          </p:cNvPr>
+          <p:cNvCxnSpPr>
+            <a:stCxn id="11" idx="6"/>
+            <a:endCxn id="10" idx="2"/>
+          </p:cNvCxnSpPr>
+          <p:nvPr/>
+        </p:nvCxnSpPr>
+        <p:spPr>
+          <a:xfrm>
+            <a:off x="4819755" y="1505709"/>
+            <a:ext cx="2296803" cy="146612"/>
+          </a:xfrm>
+          <a:prstGeom prst="line">
+            <a:avLst/>
+          </a:prstGeom>
+          <a:ln w="19050"/>
+        </p:spPr>
+        <p:style>
+          <a:lnRef idx="1">
+            <a:schemeClr val="accent1"/>
+          </a:lnRef>
+          <a:fillRef idx="0">
+            <a:schemeClr val="accent1"/>
+          </a:fillRef>
+          <a:effectRef idx="0">
+            <a:schemeClr val="accent1"/>
+          </a:effectRef>
+          <a:fontRef idx="minor">
+            <a:schemeClr val="tx1"/>
+          </a:fontRef>
+        </p:style>
+      </p:cxnSp>
+      <p:sp>
+        <p:nvSpPr>
+          <p:cNvPr id="9" name="Oval 8">
+            <a:extLst>
+              <a:ext uri="{FF2B5EF4-FFF2-40B4-BE49-F238E27FC236}">
+                <a16:creationId xmlns:a16="http://schemas.microsoft.com/office/drawing/2014/main" id="{217118A1-289A-1347-BAD4-5DD06E740E34}"/>
+              </a:ext>
+            </a:extLst>
+          </p:cNvPr>
+          <p:cNvSpPr>
+            <a:spLocks noChangeAspect="1"/>
+          </p:cNvSpPr>
+          <p:nvPr/>
+        </p:nvSpPr>
+        <p:spPr>
+          <a:xfrm>
+            <a:off x="7025118" y="995651"/>
+            <a:ext cx="182880" cy="182880"/>
+          </a:xfrm>
+          <a:prstGeom prst="ellipse">
+            <a:avLst/>
+          </a:prstGeom>
+          <a:ln>
+            <a:noFill/>
+          </a:ln>
+        </p:spPr>
+        <p:style>
+          <a:lnRef idx="2">
+            <a:schemeClr val="accent1">
+              <a:shade val="50000"/>
+            </a:schemeClr>
+          </a:lnRef>
+          <a:fillRef idx="1">
+            <a:schemeClr val="accent1"/>
+          </a:fillRef>
+          <a:effectRef idx="0">
+            <a:schemeClr val="accent1"/>
+          </a:effectRef>
+          <a:fontRef idx="minor">
+            <a:schemeClr val="lt1"/>
+          </a:fontRef>
+        </p:style>
+        <p:txBody>
+          <a:bodyPr rtlCol="0" anchor="ctr"/>
+          <a:lstStyle/>
+          <a:p>
+            <a:pPr algn="ctr"/>
+            <a:r>
+              <a:rPr lang="en-US" sz="800" dirty="0"/>
+              <a:t>10</a:t>
+            </a:r>
+          </a:p>
+        </p:txBody>
+      </p:sp>
+      <p:sp>
+        <p:nvSpPr>
+          <p:cNvPr id="10" name="Oval 9">
+            <a:extLst>
+              <a:ext uri="{FF2B5EF4-FFF2-40B4-BE49-F238E27FC236}">
+                <a16:creationId xmlns:a16="http://schemas.microsoft.com/office/drawing/2014/main" id="{86E280C7-6B65-6045-9053-AAAD32E3F225}"/>
+              </a:ext>
+            </a:extLst>
+          </p:cNvPr>
+          <p:cNvSpPr>
+            <a:spLocks noChangeAspect="1"/>
+          </p:cNvSpPr>
+          <p:nvPr/>
+        </p:nvSpPr>
+        <p:spPr>
+          <a:xfrm>
+            <a:off x="7116558" y="1560881"/>
+            <a:ext cx="182880" cy="182880"/>
+          </a:xfrm>
+          <a:prstGeom prst="ellipse">
+            <a:avLst/>
+          </a:prstGeom>
+          <a:ln>
+            <a:noFill/>
+          </a:ln>
+        </p:spPr>
+        <p:style>
+          <a:lnRef idx="2">
+            <a:schemeClr val="accent1">
+              <a:shade val="50000"/>
+            </a:schemeClr>
+          </a:lnRef>
+          <a:fillRef idx="1">
+            <a:schemeClr val="accent1"/>
+          </a:fillRef>
+          <a:effectRef idx="0">
+            <a:schemeClr val="accent1"/>
+          </a:effectRef>
+          <a:fontRef idx="minor">
+            <a:schemeClr val="lt1"/>
+          </a:fontRef>
+        </p:style>
+        <p:txBody>
+          <a:bodyPr rtlCol="0" anchor="ctr"/>
+          <a:lstStyle/>
+          <a:p>
+            <a:pPr algn="ctr"/>
+            <a:r>
+              <a:rPr lang="en-US" sz="800" dirty="0"/>
+              <a:t>12</a:t>
+            </a:r>
+          </a:p>
+        </p:txBody>
+      </p:sp>
+      <p:sp>
+        <p:nvSpPr>
+          <p:cNvPr id="11" name="Oval 10">
+            <a:extLst>
+              <a:ext uri="{FF2B5EF4-FFF2-40B4-BE49-F238E27FC236}">
+                <a16:creationId xmlns:a16="http://schemas.microsoft.com/office/drawing/2014/main" id="{B8D8C6F9-9C29-1A41-A2CC-C2F38A68E7E5}"/>
+              </a:ext>
+            </a:extLst>
+          </p:cNvPr>
+          <p:cNvSpPr>
+            <a:spLocks noChangeAspect="1"/>
+          </p:cNvSpPr>
+          <p:nvPr/>
+        </p:nvSpPr>
+        <p:spPr>
+          <a:xfrm>
+            <a:off x="4636875" y="1414269"/>
+            <a:ext cx="182880" cy="182880"/>
+          </a:xfrm>
+          <a:prstGeom prst="ellipse">
+            <a:avLst/>
+          </a:prstGeom>
+          <a:ln>
+            <a:noFill/>
+          </a:ln>
+        </p:spPr>
+        <p:style>
+          <a:lnRef idx="2">
+            <a:schemeClr val="accent1">
+              <a:shade val="50000"/>
+            </a:schemeClr>
+          </a:lnRef>
+          <a:fillRef idx="1">
+            <a:schemeClr val="accent1"/>
+          </a:fillRef>
+          <a:effectRef idx="0">
+            <a:schemeClr val="accent1"/>
+          </a:effectRef>
+          <a:fontRef idx="minor">
+            <a:schemeClr val="lt1"/>
+          </a:fontRef>
+        </p:style>
+        <p:txBody>
+          <a:bodyPr rtlCol="0" anchor="ctr"/>
+          <a:lstStyle/>
+          <a:p>
+            <a:pPr algn="ctr"/>
+            <a:r>
+              <a:rPr lang="en-US" sz="800" dirty="0"/>
+              <a:t>6</a:t>
+            </a:r>
+          </a:p>
+        </p:txBody>
+      </p:sp>
+      <p:sp>
+        <p:nvSpPr>
+          <p:cNvPr id="16" name="Oval 15">
+            <a:extLst>
+              <a:ext uri="{FF2B5EF4-FFF2-40B4-BE49-F238E27FC236}">
+                <a16:creationId xmlns:a16="http://schemas.microsoft.com/office/drawing/2014/main" id="{0093D1FE-2868-BB45-A8A8-DCF62542B5E9}"/>
+              </a:ext>
+            </a:extLst>
+          </p:cNvPr>
+          <p:cNvSpPr>
+            <a:spLocks noChangeAspect="1"/>
+          </p:cNvSpPr>
+          <p:nvPr/>
+        </p:nvSpPr>
+        <p:spPr>
+          <a:xfrm>
+            <a:off x="5167542" y="1469284"/>
+            <a:ext cx="182880" cy="182880"/>
+          </a:xfrm>
+          <a:prstGeom prst="ellipse">
+            <a:avLst/>
+          </a:prstGeom>
+          <a:ln>
+            <a:noFill/>
+          </a:ln>
+        </p:spPr>
+        <p:style>
+          <a:lnRef idx="2">
+            <a:schemeClr val="accent1">
+              <a:shade val="50000"/>
+            </a:schemeClr>
+          </a:lnRef>
+          <a:fillRef idx="1">
+            <a:schemeClr val="accent1"/>
+          </a:fillRef>
+          <a:effectRef idx="0">
+            <a:schemeClr val="accent1"/>
+          </a:effectRef>
+          <a:fontRef idx="minor">
+            <a:schemeClr val="lt1"/>
+          </a:fontRef>
+        </p:style>
+        <p:txBody>
+          <a:bodyPr rtlCol="0" anchor="ctr"/>
+          <a:lstStyle/>
+          <a:p>
+            <a:pPr algn="ctr"/>
+            <a:r>
+              <a:rPr lang="en-US" sz="800" dirty="0"/>
+              <a:t>7</a:t>
+            </a:r>
+          </a:p>
+        </p:txBody>
+      </p:sp>
+      <p:sp>
+        <p:nvSpPr>
+          <p:cNvPr id="17" name="Oval 16">
+            <a:extLst>
+              <a:ext uri="{FF2B5EF4-FFF2-40B4-BE49-F238E27FC236}">
+                <a16:creationId xmlns:a16="http://schemas.microsoft.com/office/drawing/2014/main" id="{FACE3DA4-0699-7C4D-AEC6-C18F094F2D53}"/>
+              </a:ext>
+            </a:extLst>
+          </p:cNvPr>
+          <p:cNvSpPr>
+            <a:spLocks noChangeAspect="1"/>
+          </p:cNvSpPr>
+          <p:nvPr/>
+        </p:nvSpPr>
+        <p:spPr>
+          <a:xfrm>
+            <a:off x="5698209" y="1505709"/>
+            <a:ext cx="182880" cy="182880"/>
+          </a:xfrm>
+          <a:prstGeom prst="ellipse">
+            <a:avLst/>
+          </a:prstGeom>
+          <a:ln>
+            <a:noFill/>
+          </a:ln>
+        </p:spPr>
+        <p:style>
+          <a:lnRef idx="2">
+            <a:schemeClr val="accent1">
+              <a:shade val="50000"/>
+            </a:schemeClr>
+          </a:lnRef>
+          <a:fillRef idx="1">
+            <a:schemeClr val="accent1"/>
+          </a:fillRef>
+          <a:effectRef idx="0">
+            <a:schemeClr val="accent1"/>
+          </a:effectRef>
+          <a:fontRef idx="minor">
+            <a:schemeClr val="lt1"/>
+          </a:fontRef>
+        </p:style>
+        <p:txBody>
+          <a:bodyPr rtlCol="0" anchor="ctr"/>
+          <a:lstStyle/>
+          <a:p>
+            <a:pPr algn="ctr"/>
+            <a:r>
+              <a:rPr lang="en-US" sz="800" dirty="0"/>
+              <a:t>8</a:t>
+            </a:r>
+          </a:p>
+        </p:txBody>
+      </p:sp>
+      <p:sp>
+        <p:nvSpPr>
+          <p:cNvPr id="18" name="Oval 17">
+            <a:extLst>
+              <a:ext uri="{FF2B5EF4-FFF2-40B4-BE49-F238E27FC236}">
+                <a16:creationId xmlns:a16="http://schemas.microsoft.com/office/drawing/2014/main" id="{A5F93DD5-5B69-D94A-884B-85D9AF655751}"/>
+              </a:ext>
+            </a:extLst>
+          </p:cNvPr>
+          <p:cNvSpPr>
+            <a:spLocks noChangeAspect="1"/>
+          </p:cNvSpPr>
+          <p:nvPr/>
+        </p:nvSpPr>
+        <p:spPr>
+          <a:xfrm>
+            <a:off x="6453000" y="1560881"/>
+            <a:ext cx="182880" cy="182880"/>
+          </a:xfrm>
+          <a:prstGeom prst="ellipse">
+            <a:avLst/>
+          </a:prstGeom>
+          <a:ln>
+            <a:noFill/>
+          </a:ln>
+        </p:spPr>
+        <p:style>
+          <a:lnRef idx="2">
+            <a:schemeClr val="accent1">
+              <a:shade val="50000"/>
+            </a:schemeClr>
+          </a:lnRef>
+          <a:fillRef idx="1">
+            <a:schemeClr val="accent1"/>
+          </a:fillRef>
+          <a:effectRef idx="0">
+            <a:schemeClr val="accent1"/>
+          </a:effectRef>
+          <a:fontRef idx="minor">
+            <a:schemeClr val="lt1"/>
+          </a:fontRef>
+        </p:style>
+        <p:txBody>
+          <a:bodyPr rtlCol="0" anchor="ctr"/>
+          <a:lstStyle/>
+          <a:p>
+            <a:pPr algn="ctr"/>
+            <a:r>
+              <a:rPr lang="en-US" sz="800" dirty="0"/>
+              <a:t>11</a:t>
+            </a:r>
+          </a:p>
+        </p:txBody>
+      </p:sp>
+      <p:sp>
+        <p:nvSpPr>
+          <p:cNvPr id="19" name="Oval 18">
+            <a:extLst>
+              <a:ext uri="{FF2B5EF4-FFF2-40B4-BE49-F238E27FC236}">
+                <a16:creationId xmlns:a16="http://schemas.microsoft.com/office/drawing/2014/main" id="{1247D3CB-A22A-534F-900A-B4958C4184E1}"/>
+              </a:ext>
+            </a:extLst>
+          </p:cNvPr>
+          <p:cNvSpPr>
+            <a:spLocks noChangeAspect="1"/>
+          </p:cNvSpPr>
+          <p:nvPr/>
+        </p:nvSpPr>
+        <p:spPr>
+          <a:xfrm>
+            <a:off x="6448041" y="1063169"/>
+            <a:ext cx="182880" cy="182880"/>
+          </a:xfrm>
+          <a:prstGeom prst="ellipse">
+            <a:avLst/>
+          </a:prstGeom>
+          <a:ln>
+            <a:noFill/>
+          </a:ln>
+        </p:spPr>
+        <p:style>
+          <a:lnRef idx="2">
+            <a:schemeClr val="accent1">
+              <a:shade val="50000"/>
+            </a:schemeClr>
+          </a:lnRef>
+          <a:fillRef idx="1">
+            <a:schemeClr val="accent1"/>
+          </a:fillRef>
+          <a:effectRef idx="0">
+            <a:schemeClr val="accent1"/>
+          </a:effectRef>
+          <a:fontRef idx="minor">
+            <a:schemeClr val="lt1"/>
+          </a:fontRef>
+        </p:style>
+        <p:txBody>
+          <a:bodyPr rtlCol="0" anchor="ctr"/>
+          <a:lstStyle/>
+          <a:p>
+            <a:pPr algn="ctr"/>
+            <a:r>
+              <a:rPr lang="en-US" sz="800" dirty="0"/>
+              <a:t>9</a:t>
+            </a:r>
+          </a:p>
+        </p:txBody>
+      </p:sp>
+      <p:sp>
+        <p:nvSpPr>
+          <p:cNvPr id="3" name="Oval 2">
+            <a:extLst>
+              <a:ext uri="{FF2B5EF4-FFF2-40B4-BE49-F238E27FC236}">
+                <a16:creationId xmlns:a16="http://schemas.microsoft.com/office/drawing/2014/main" id="{FEC3865D-F95A-334E-941C-565FAC569104}"/>
+              </a:ext>
+            </a:extLst>
+          </p:cNvPr>
+          <p:cNvSpPr>
+            <a:spLocks noChangeAspect="1"/>
+          </p:cNvSpPr>
+          <p:nvPr/>
+        </p:nvSpPr>
+        <p:spPr>
+          <a:xfrm>
+            <a:off x="4914282" y="995651"/>
+            <a:ext cx="182880" cy="182880"/>
+          </a:xfrm>
+          <a:prstGeom prst="ellipse">
+            <a:avLst/>
+          </a:prstGeom>
+          <a:ln>
+            <a:noFill/>
+          </a:ln>
+        </p:spPr>
+        <p:style>
+          <a:lnRef idx="2">
+            <a:schemeClr val="accent1">
+              <a:shade val="50000"/>
+            </a:schemeClr>
+          </a:lnRef>
+          <a:fillRef idx="1">
+            <a:schemeClr val="accent1"/>
+          </a:fillRef>
+          <a:effectRef idx="0">
+            <a:schemeClr val="accent1"/>
+          </a:effectRef>
+          <a:fontRef idx="minor">
+            <a:schemeClr val="lt1"/>
+          </a:fontRef>
+        </p:style>
+        <p:txBody>
+          <a:bodyPr rtlCol="0" anchor="ctr"/>
+          <a:lstStyle/>
+          <a:p>
+            <a:pPr algn="ctr"/>
+            <a:r>
+              <a:rPr lang="en-US" sz="800" dirty="0"/>
+              <a:t>1</a:t>
+            </a:r>
+          </a:p>
+        </p:txBody>
+      </p:sp>
+      <p:sp>
+        <p:nvSpPr>
+          <p:cNvPr id="5" name="Oval 4">
+            <a:extLst>
+              <a:ext uri="{FF2B5EF4-FFF2-40B4-BE49-F238E27FC236}">
+                <a16:creationId xmlns:a16="http://schemas.microsoft.com/office/drawing/2014/main" id="{09359E9F-ADD3-954C-9744-F85CCBF8D56C}"/>
+              </a:ext>
+            </a:extLst>
+          </p:cNvPr>
+          <p:cNvSpPr>
+            <a:spLocks noChangeAspect="1"/>
+          </p:cNvSpPr>
+          <p:nvPr/>
+        </p:nvSpPr>
+        <p:spPr>
+          <a:xfrm>
+            <a:off x="5211744" y="895630"/>
+            <a:ext cx="182880" cy="182880"/>
+          </a:xfrm>
+          <a:prstGeom prst="ellipse">
+            <a:avLst/>
+          </a:prstGeom>
+          <a:ln>
+            <a:noFill/>
+          </a:ln>
+        </p:spPr>
+        <p:style>
+          <a:lnRef idx="2">
+            <a:schemeClr val="accent1">
+              <a:shade val="50000"/>
+            </a:schemeClr>
+          </a:lnRef>
+          <a:fillRef idx="1">
+            <a:schemeClr val="accent1"/>
+          </a:fillRef>
+          <a:effectRef idx="0">
+            <a:schemeClr val="accent1"/>
+          </a:effectRef>
+          <a:fontRef idx="minor">
+            <a:schemeClr val="lt1"/>
+          </a:fontRef>
+        </p:style>
+        <p:txBody>
+          <a:bodyPr rtlCol="0" anchor="ctr"/>
+          <a:lstStyle/>
+          <a:p>
+            <a:pPr algn="ctr"/>
+            <a:r>
+              <a:rPr lang="en-US" sz="800" dirty="0"/>
+              <a:t>2</a:t>
+            </a:r>
+          </a:p>
+        </p:txBody>
+      </p:sp>
+      <p:sp>
+        <p:nvSpPr>
+          <p:cNvPr id="7" name="Oval 6">
+            <a:extLst>
+              <a:ext uri="{FF2B5EF4-FFF2-40B4-BE49-F238E27FC236}">
+                <a16:creationId xmlns:a16="http://schemas.microsoft.com/office/drawing/2014/main" id="{DE920A88-45AB-F143-8E32-7A90364A26A3}"/>
+              </a:ext>
+            </a:extLst>
+          </p:cNvPr>
+          <p:cNvSpPr>
+            <a:spLocks noChangeAspect="1"/>
+          </p:cNvSpPr>
+          <p:nvPr/>
+        </p:nvSpPr>
+        <p:spPr>
+          <a:xfrm>
+            <a:off x="6473391" y="565458"/>
+            <a:ext cx="182880" cy="182880"/>
+          </a:xfrm>
+          <a:prstGeom prst="ellipse">
+            <a:avLst/>
+          </a:prstGeom>
+          <a:ln>
+            <a:noFill/>
+          </a:ln>
+        </p:spPr>
+        <p:style>
+          <a:lnRef idx="2">
+            <a:schemeClr val="accent1">
+              <a:shade val="50000"/>
+            </a:schemeClr>
+          </a:lnRef>
+          <a:fillRef idx="1">
+            <a:schemeClr val="accent1"/>
+          </a:fillRef>
+          <a:effectRef idx="0">
+            <a:schemeClr val="accent1"/>
+          </a:effectRef>
+          <a:fontRef idx="minor">
+            <a:schemeClr val="lt1"/>
+          </a:fontRef>
+        </p:style>
+        <p:txBody>
+          <a:bodyPr rtlCol="0" anchor="ctr"/>
+          <a:lstStyle/>
+          <a:p>
+            <a:pPr algn="ctr"/>
+            <a:r>
+              <a:rPr lang="en-US" sz="800" dirty="0"/>
+              <a:t>4</a:t>
+            </a:r>
+          </a:p>
+        </p:txBody>
+      </p:sp>
+      <p:sp>
+        <p:nvSpPr>
+          <p:cNvPr id="8" name="Oval 7">
+            <a:extLst>
+              <a:ext uri="{FF2B5EF4-FFF2-40B4-BE49-F238E27FC236}">
+                <a16:creationId xmlns:a16="http://schemas.microsoft.com/office/drawing/2014/main" id="{B4FC9E13-A323-C340-A121-7654738B63AD}"/>
+              </a:ext>
+            </a:extLst>
+          </p:cNvPr>
+          <p:cNvSpPr>
+            <a:spLocks noChangeAspect="1"/>
+          </p:cNvSpPr>
+          <p:nvPr/>
+        </p:nvSpPr>
+        <p:spPr>
+          <a:xfrm>
+            <a:off x="6971103" y="430421"/>
+            <a:ext cx="182880" cy="182880"/>
+          </a:xfrm>
+          <a:prstGeom prst="ellipse">
+            <a:avLst/>
+          </a:prstGeom>
+          <a:ln>
+            <a:noFill/>
+          </a:ln>
+        </p:spPr>
+        <p:style>
+          <a:lnRef idx="2">
+            <a:schemeClr val="accent1">
+              <a:shade val="50000"/>
+            </a:schemeClr>
+          </a:lnRef>
+          <a:fillRef idx="1">
+            <a:schemeClr val="accent1"/>
+          </a:fillRef>
+          <a:effectRef idx="0">
+            <a:schemeClr val="accent1"/>
+          </a:effectRef>
+          <a:fontRef idx="minor">
+            <a:schemeClr val="lt1"/>
+          </a:fontRef>
+        </p:style>
+        <p:txBody>
+          <a:bodyPr rtlCol="0" anchor="ctr"/>
+          <a:lstStyle/>
+          <a:p>
+            <a:pPr algn="ctr"/>
+            <a:r>
+              <a:rPr lang="en-US" sz="800" dirty="0"/>
+              <a:t>5</a:t>
+            </a:r>
+          </a:p>
+        </p:txBody>
+      </p:sp>
+      <p:sp>
+        <p:nvSpPr>
+          <p:cNvPr id="6" name="Oval 5">
+            <a:extLst>
+              <a:ext uri="{FF2B5EF4-FFF2-40B4-BE49-F238E27FC236}">
+                <a16:creationId xmlns:a16="http://schemas.microsoft.com/office/drawing/2014/main" id="{C0AAACCB-ECD0-ED42-891B-EADAA9F2BEC2}"/>
+              </a:ext>
+            </a:extLst>
+          </p:cNvPr>
+          <p:cNvSpPr>
+            <a:spLocks noChangeAspect="1"/>
+          </p:cNvSpPr>
+          <p:nvPr/>
+        </p:nvSpPr>
+        <p:spPr>
+          <a:xfrm>
+            <a:off x="5748416" y="763886"/>
+            <a:ext cx="182880" cy="182880"/>
+          </a:xfrm>
+          <a:prstGeom prst="ellipse">
+            <a:avLst/>
+          </a:prstGeom>
+          <a:ln>
+            <a:noFill/>
+          </a:ln>
+        </p:spPr>
+        <p:style>
+          <a:lnRef idx="2">
+            <a:schemeClr val="accent1">
+              <a:shade val="50000"/>
+            </a:schemeClr>
+          </a:lnRef>
+          <a:fillRef idx="1">
+            <a:schemeClr val="accent1"/>
+          </a:fillRef>
+          <a:effectRef idx="0">
+            <a:schemeClr val="accent1"/>
+          </a:effectRef>
+          <a:fontRef idx="minor">
+            <a:schemeClr val="lt1"/>
+          </a:fontRef>
+        </p:style>
+        <p:txBody>
+          <a:bodyPr rtlCol="0" anchor="ctr"/>
+          <a:lstStyle/>
+          <a:p>
+            <a:pPr algn="ctr"/>
+            <a:r>
+              <a:rPr lang="en-US" sz="800" dirty="0"/>
+              <a:t>3</a:t>
+            </a:r>
+          </a:p>
+        </p:txBody>
+      </p:sp>
+      <p:cxnSp>
+        <p:nvCxnSpPr>
+          <p:cNvPr id="71" name="Straight Connector 70">
+            <a:extLst>
+              <a:ext uri="{FF2B5EF4-FFF2-40B4-BE49-F238E27FC236}">
+                <a16:creationId xmlns:a16="http://schemas.microsoft.com/office/drawing/2014/main" id="{FC43EE64-A8F4-B54B-8FFD-CDED17BCAA5F}"/>
+              </a:ext>
+            </a:extLst>
+          </p:cNvPr>
+          <p:cNvCxnSpPr>
+            <a:stCxn id="18" idx="4"/>
+            <a:endCxn id="21" idx="0"/>
+          </p:cNvCxnSpPr>
+          <p:nvPr/>
+        </p:nvCxnSpPr>
+        <p:spPr>
+          <a:xfrm flipH="1">
+            <a:off x="6508887" y="1743761"/>
+            <a:ext cx="35553" cy="1160633"/>
+          </a:xfrm>
+          <a:prstGeom prst="line">
+            <a:avLst/>
+          </a:prstGeom>
+          <a:ln w="19050"/>
+        </p:spPr>
+        <p:style>
+          <a:lnRef idx="1">
+            <a:schemeClr val="accent1"/>
+          </a:lnRef>
+          <a:fillRef idx="0">
+            <a:schemeClr val="accent1"/>
+          </a:fillRef>
+          <a:effectRef idx="0">
+            <a:schemeClr val="accent1"/>
+          </a:effectRef>
+          <a:fontRef idx="minor">
+            <a:schemeClr val="tx1"/>
+          </a:fontRef>
+        </p:style>
+      </p:cxnSp>
+      <p:cxnSp>
+        <p:nvCxnSpPr>
+          <p:cNvPr id="73" name="Straight Connector 72">
+            <a:extLst>
+              <a:ext uri="{FF2B5EF4-FFF2-40B4-BE49-F238E27FC236}">
+                <a16:creationId xmlns:a16="http://schemas.microsoft.com/office/drawing/2014/main" id="{18C69F6E-5632-D042-9DA9-44AA85BE4503}"/>
+              </a:ext>
+            </a:extLst>
+          </p:cNvPr>
+          <p:cNvCxnSpPr>
+            <a:stCxn id="24" idx="6"/>
+            <a:endCxn id="28" idx="2"/>
+          </p:cNvCxnSpPr>
+          <p:nvPr/>
+        </p:nvCxnSpPr>
+        <p:spPr>
+          <a:xfrm flipV="1">
+            <a:off x="4999599" y="2987540"/>
+            <a:ext cx="1973019" cy="8294"/>
+          </a:xfrm>
+          <a:prstGeom prst="line">
+            <a:avLst/>
+          </a:prstGeom>
+          <a:ln w="19050"/>
+        </p:spPr>
+        <p:style>
+          <a:lnRef idx="1">
+            <a:schemeClr val="accent1"/>
+          </a:lnRef>
+          <a:fillRef idx="0">
+            <a:schemeClr val="accent1"/>
+          </a:fillRef>
+          <a:effectRef idx="0">
+            <a:schemeClr val="accent1"/>
+          </a:effectRef>
+          <a:fontRef idx="minor">
+            <a:schemeClr val="tx1"/>
+          </a:fontRef>
+        </p:style>
+      </p:cxnSp>
+      <p:sp>
+        <p:nvSpPr>
+          <p:cNvPr id="21" name="Oval 20">
+            <a:extLst>
+              <a:ext uri="{FF2B5EF4-FFF2-40B4-BE49-F238E27FC236}">
+                <a16:creationId xmlns:a16="http://schemas.microsoft.com/office/drawing/2014/main" id="{31CBA096-6B57-ED48-8CCA-5191DD2A9623}"/>
+              </a:ext>
+            </a:extLst>
+          </p:cNvPr>
+          <p:cNvSpPr>
+            <a:spLocks noChangeAspect="1"/>
+          </p:cNvSpPr>
+          <p:nvPr/>
+        </p:nvSpPr>
+        <p:spPr>
+          <a:xfrm>
+            <a:off x="6417447" y="2904394"/>
+            <a:ext cx="182880" cy="182880"/>
+          </a:xfrm>
+          <a:prstGeom prst="ellipse">
+            <a:avLst/>
+          </a:prstGeom>
+          <a:ln>
+            <a:noFill/>
+          </a:ln>
+        </p:spPr>
+        <p:style>
+          <a:lnRef idx="2">
+            <a:schemeClr val="accent1">
+              <a:shade val="50000"/>
+            </a:schemeClr>
+          </a:lnRef>
+          <a:fillRef idx="1">
+            <a:schemeClr val="accent1"/>
+          </a:fillRef>
+          <a:effectRef idx="0">
+            <a:schemeClr val="accent1"/>
+          </a:effectRef>
+          <a:fontRef idx="minor">
+            <a:schemeClr val="lt1"/>
+          </a:fontRef>
+        </p:style>
+        <p:txBody>
+          <a:bodyPr rtlCol="0" anchor="ctr"/>
+          <a:lstStyle/>
+          <a:p>
+            <a:pPr algn="ctr"/>
+            <a:r>
+              <a:rPr lang="en-US" sz="800" dirty="0"/>
+              <a:t>17</a:t>
+            </a:r>
+          </a:p>
+        </p:txBody>
+      </p:sp>
+      <p:sp>
+        <p:nvSpPr>
+          <p:cNvPr id="22" name="Oval 21">
+            <a:extLst>
+              <a:ext uri="{FF2B5EF4-FFF2-40B4-BE49-F238E27FC236}">
+                <a16:creationId xmlns:a16="http://schemas.microsoft.com/office/drawing/2014/main" id="{7A177B44-48DA-A240-A4C7-535EE99A7F3B}"/>
+              </a:ext>
+            </a:extLst>
+          </p:cNvPr>
+          <p:cNvSpPr>
+            <a:spLocks noChangeAspect="1"/>
+          </p:cNvSpPr>
+          <p:nvPr/>
+        </p:nvSpPr>
+        <p:spPr>
+          <a:xfrm>
+            <a:off x="5881089" y="2904394"/>
+            <a:ext cx="182880" cy="182880"/>
+          </a:xfrm>
+          <a:prstGeom prst="ellipse">
+            <a:avLst/>
+          </a:prstGeom>
+          <a:ln>
+            <a:noFill/>
+          </a:ln>
+        </p:spPr>
+        <p:style>
+          <a:lnRef idx="2">
+            <a:schemeClr val="accent1">
+              <a:shade val="50000"/>
+            </a:schemeClr>
+          </a:lnRef>
+          <a:fillRef idx="1">
+            <a:schemeClr val="accent1"/>
+          </a:fillRef>
+          <a:effectRef idx="0">
+            <a:schemeClr val="accent1"/>
+          </a:effectRef>
+          <a:fontRef idx="minor">
+            <a:schemeClr val="lt1"/>
+          </a:fontRef>
+        </p:style>
+        <p:txBody>
+          <a:bodyPr rtlCol="0" anchor="ctr"/>
+          <a:lstStyle/>
+          <a:p>
+            <a:pPr algn="ctr"/>
+            <a:r>
+              <a:rPr lang="en-US" sz="800" dirty="0"/>
+              <a:t>16</a:t>
+            </a:r>
+          </a:p>
+        </p:txBody>
+      </p:sp>
+      <p:sp>
+        <p:nvSpPr>
+          <p:cNvPr id="23" name="Oval 22">
+            <a:extLst>
+              <a:ext uri="{FF2B5EF4-FFF2-40B4-BE49-F238E27FC236}">
+                <a16:creationId xmlns:a16="http://schemas.microsoft.com/office/drawing/2014/main" id="{C56A41E1-5CD0-BF4C-82B6-741C50026FC2}"/>
+              </a:ext>
+            </a:extLst>
+          </p:cNvPr>
+          <p:cNvSpPr>
+            <a:spLocks noChangeAspect="1"/>
+          </p:cNvSpPr>
+          <p:nvPr/>
+        </p:nvSpPr>
+        <p:spPr>
+          <a:xfrm>
+            <a:off x="5303184" y="2904394"/>
+            <a:ext cx="182880" cy="182880"/>
+          </a:xfrm>
+          <a:prstGeom prst="ellipse">
+            <a:avLst/>
+          </a:prstGeom>
+          <a:ln>
+            <a:noFill/>
+          </a:ln>
+        </p:spPr>
+        <p:style>
+          <a:lnRef idx="2">
+            <a:schemeClr val="accent1">
+              <a:shade val="50000"/>
+            </a:schemeClr>
+          </a:lnRef>
+          <a:fillRef idx="1">
+            <a:schemeClr val="accent1"/>
+          </a:fillRef>
+          <a:effectRef idx="0">
+            <a:schemeClr val="accent1"/>
+          </a:effectRef>
+          <a:fontRef idx="minor">
+            <a:schemeClr val="lt1"/>
+          </a:fontRef>
+        </p:style>
+        <p:txBody>
+          <a:bodyPr rtlCol="0" anchor="ctr"/>
+          <a:lstStyle/>
+          <a:p>
+            <a:pPr algn="ctr"/>
+            <a:r>
+              <a:rPr lang="en-US" sz="800" dirty="0"/>
+              <a:t>15</a:t>
+            </a:r>
+          </a:p>
+        </p:txBody>
+      </p:sp>
+      <p:sp>
+        <p:nvSpPr>
+          <p:cNvPr id="24" name="Oval 23">
+            <a:extLst>
+              <a:ext uri="{FF2B5EF4-FFF2-40B4-BE49-F238E27FC236}">
+                <a16:creationId xmlns:a16="http://schemas.microsoft.com/office/drawing/2014/main" id="{079D1E90-9A81-8244-BF54-462FBF0F8C11}"/>
+              </a:ext>
+            </a:extLst>
+          </p:cNvPr>
+          <p:cNvSpPr>
+            <a:spLocks noChangeAspect="1"/>
+          </p:cNvSpPr>
+          <p:nvPr/>
+        </p:nvSpPr>
+        <p:spPr>
+          <a:xfrm>
+            <a:off x="4816719" y="2904394"/>
+            <a:ext cx="182880" cy="182880"/>
+          </a:xfrm>
+          <a:prstGeom prst="ellipse">
+            <a:avLst/>
+          </a:prstGeom>
+          <a:ln>
+            <a:noFill/>
+          </a:ln>
+        </p:spPr>
+        <p:style>
+          <a:lnRef idx="2">
+            <a:schemeClr val="accent1">
+              <a:shade val="50000"/>
+            </a:schemeClr>
+          </a:lnRef>
+          <a:fillRef idx="1">
+            <a:schemeClr val="accent1"/>
+          </a:fillRef>
+          <a:effectRef idx="0">
+            <a:schemeClr val="accent1"/>
+          </a:effectRef>
+          <a:fontRef idx="minor">
+            <a:schemeClr val="lt1"/>
+          </a:fontRef>
+        </p:style>
+        <p:txBody>
+          <a:bodyPr rtlCol="0" anchor="ctr"/>
+          <a:lstStyle/>
+          <a:p>
+            <a:pPr algn="ctr"/>
+            <a:r>
+              <a:rPr lang="en-US" sz="800" dirty="0"/>
+              <a:t>14</a:t>
+            </a:r>
+          </a:p>
+        </p:txBody>
+      </p:sp>
+      <p:cxnSp>
+        <p:nvCxnSpPr>
+          <p:cNvPr id="75" name="Straight Connector 74">
+            <a:extLst>
+              <a:ext uri="{FF2B5EF4-FFF2-40B4-BE49-F238E27FC236}">
+                <a16:creationId xmlns:a16="http://schemas.microsoft.com/office/drawing/2014/main" id="{4E915BAE-95AB-4540-891A-43315302A88D}"/>
+              </a:ext>
+            </a:extLst>
+          </p:cNvPr>
+          <p:cNvCxnSpPr>
+            <a:cxnSpLocks/>
+            <a:stCxn id="28" idx="4"/>
+          </p:cNvCxnSpPr>
+          <p:nvPr/>
+        </p:nvCxnSpPr>
+        <p:spPr>
+          <a:xfrm flipH="1">
+            <a:off x="6866965" y="3078980"/>
+            <a:ext cx="197093" cy="641549"/>
+          </a:xfrm>
+          <a:prstGeom prst="line">
+            <a:avLst/>
+          </a:prstGeom>
+          <a:ln w="19050"/>
+        </p:spPr>
+        <p:style>
+          <a:lnRef idx="1">
+            <a:schemeClr val="accent1"/>
+          </a:lnRef>
+          <a:fillRef idx="0">
+            <a:schemeClr val="accent1"/>
+          </a:fillRef>
+          <a:effectRef idx="0">
+            <a:schemeClr val="accent1"/>
+          </a:effectRef>
+          <a:fontRef idx="minor">
+            <a:schemeClr val="tx1"/>
+          </a:fontRef>
+        </p:style>
+      </p:cxnSp>
+      <p:sp>
+        <p:nvSpPr>
+          <p:cNvPr id="29" name="Oval 28">
+            <a:extLst>
+              <a:ext uri="{FF2B5EF4-FFF2-40B4-BE49-F238E27FC236}">
+                <a16:creationId xmlns:a16="http://schemas.microsoft.com/office/drawing/2014/main" id="{2A07F59D-7BB6-F94B-80C0-C5D73C5596EE}"/>
+              </a:ext>
+            </a:extLst>
+          </p:cNvPr>
+          <p:cNvSpPr>
+            <a:spLocks noChangeAspect="1"/>
+          </p:cNvSpPr>
+          <p:nvPr/>
+        </p:nvSpPr>
+        <p:spPr>
+          <a:xfrm>
+            <a:off x="6879663" y="3224228"/>
+            <a:ext cx="182880" cy="182880"/>
+          </a:xfrm>
+          <a:prstGeom prst="ellipse">
+            <a:avLst/>
+          </a:prstGeom>
+          <a:ln>
+            <a:noFill/>
+          </a:ln>
+        </p:spPr>
+        <p:style>
+          <a:lnRef idx="2">
+            <a:schemeClr val="accent1">
+              <a:shade val="50000"/>
+            </a:schemeClr>
+          </a:lnRef>
+          <a:fillRef idx="1">
+            <a:schemeClr val="accent1"/>
+          </a:fillRef>
+          <a:effectRef idx="0">
+            <a:schemeClr val="accent1"/>
+          </a:effectRef>
+          <a:fontRef idx="minor">
+            <a:schemeClr val="lt1"/>
+          </a:fontRef>
+        </p:style>
+        <p:txBody>
+          <a:bodyPr rtlCol="0" anchor="ctr"/>
+          <a:lstStyle/>
+          <a:p>
+            <a:pPr algn="ctr"/>
+            <a:r>
+              <a:rPr lang="en-US" sz="800" dirty="0"/>
+              <a:t>22</a:t>
+            </a:r>
+          </a:p>
+        </p:txBody>
+      </p:sp>
+      <p:sp>
+        <p:nvSpPr>
+          <p:cNvPr id="30" name="Oval 29">
+            <a:extLst>
+              <a:ext uri="{FF2B5EF4-FFF2-40B4-BE49-F238E27FC236}">
+                <a16:creationId xmlns:a16="http://schemas.microsoft.com/office/drawing/2014/main" id="{60471717-E2D8-7C40-B2FB-46AFEE103612}"/>
+              </a:ext>
+            </a:extLst>
+          </p:cNvPr>
+          <p:cNvSpPr>
+            <a:spLocks noChangeAspect="1"/>
+          </p:cNvSpPr>
+          <p:nvPr/>
+        </p:nvSpPr>
+        <p:spPr>
+          <a:xfrm>
+            <a:off x="6732250" y="3720529"/>
+            <a:ext cx="182880" cy="182880"/>
+          </a:xfrm>
+          <a:prstGeom prst="ellipse">
+            <a:avLst/>
+          </a:prstGeom>
+          <a:ln>
+            <a:noFill/>
+          </a:ln>
+        </p:spPr>
+        <p:style>
+          <a:lnRef idx="2">
+            <a:schemeClr val="accent1">
+              <a:shade val="50000"/>
+            </a:schemeClr>
+          </a:lnRef>
+          <a:fillRef idx="1">
+            <a:schemeClr val="accent1"/>
+          </a:fillRef>
+          <a:effectRef idx="0">
+            <a:schemeClr val="accent1"/>
+          </a:effectRef>
+          <a:fontRef idx="minor">
+            <a:schemeClr val="lt1"/>
+          </a:fontRef>
+        </p:style>
+        <p:txBody>
+          <a:bodyPr rtlCol="0" anchor="ctr"/>
+          <a:lstStyle/>
+          <a:p>
+            <a:pPr algn="ctr"/>
+            <a:r>
+              <a:rPr lang="en-US" sz="800" dirty="0"/>
+              <a:t>26</a:t>
+            </a:r>
+          </a:p>
+        </p:txBody>
+      </p:sp>
+      <p:sp>
+        <p:nvSpPr>
+          <p:cNvPr id="28" name="Oval 27">
+            <a:extLst>
+              <a:ext uri="{FF2B5EF4-FFF2-40B4-BE49-F238E27FC236}">
+                <a16:creationId xmlns:a16="http://schemas.microsoft.com/office/drawing/2014/main" id="{71D4AAD1-B2ED-E64B-8789-0595F7CC5B82}"/>
+              </a:ext>
+            </a:extLst>
+          </p:cNvPr>
+          <p:cNvSpPr>
+            <a:spLocks noChangeAspect="1"/>
+          </p:cNvSpPr>
+          <p:nvPr/>
+        </p:nvSpPr>
+        <p:spPr>
+          <a:xfrm>
+            <a:off x="6972618" y="2896100"/>
+            <a:ext cx="182880" cy="182880"/>
+          </a:xfrm>
+          <a:prstGeom prst="ellipse">
+            <a:avLst/>
+          </a:prstGeom>
+          <a:ln>
+            <a:noFill/>
+          </a:ln>
+        </p:spPr>
+        <p:style>
+          <a:lnRef idx="2">
+            <a:schemeClr val="accent1">
+              <a:shade val="50000"/>
+            </a:schemeClr>
+          </a:lnRef>
+          <a:fillRef idx="1">
+            <a:schemeClr val="accent1"/>
+          </a:fillRef>
+          <a:effectRef idx="0">
+            <a:schemeClr val="accent1"/>
+          </a:effectRef>
+          <a:fontRef idx="minor">
+            <a:schemeClr val="lt1"/>
+          </a:fontRef>
+        </p:style>
+        <p:txBody>
+          <a:bodyPr rtlCol="0" anchor="ctr"/>
+          <a:lstStyle/>
+          <a:p>
+            <a:pPr algn="ctr"/>
+            <a:r>
+              <a:rPr lang="en-US" sz="800" dirty="0"/>
+              <a:t>18</a:t>
+            </a:r>
+          </a:p>
+        </p:txBody>
+      </p:sp>
+      <p:cxnSp>
+        <p:nvCxnSpPr>
+          <p:cNvPr id="79" name="Straight Connector 78">
+            <a:extLst>
+              <a:ext uri="{FF2B5EF4-FFF2-40B4-BE49-F238E27FC236}">
+                <a16:creationId xmlns:a16="http://schemas.microsoft.com/office/drawing/2014/main" id="{BBF93830-38B9-534A-9C19-8D7307595A08}"/>
+              </a:ext>
+            </a:extLst>
+          </p:cNvPr>
+          <p:cNvCxnSpPr>
+            <a:stCxn id="21" idx="3"/>
+            <a:endCxn id="32" idx="0"/>
+          </p:cNvCxnSpPr>
+          <p:nvPr/>
+        </p:nvCxnSpPr>
+        <p:spPr>
+          <a:xfrm flipH="1">
+            <a:off x="6294115" y="3060492"/>
+            <a:ext cx="150114" cy="346616"/>
+          </a:xfrm>
+          <a:prstGeom prst="line">
+            <a:avLst/>
+          </a:prstGeom>
+          <a:ln w="19050"/>
+        </p:spPr>
+        <p:style>
+          <a:lnRef idx="1">
+            <a:schemeClr val="accent1"/>
+          </a:lnRef>
+          <a:fillRef idx="0">
+            <a:schemeClr val="accent1"/>
+          </a:fillRef>
+          <a:effectRef idx="0">
+            <a:schemeClr val="accent1"/>
+          </a:effectRef>
+          <a:fontRef idx="minor">
+            <a:schemeClr val="tx1"/>
+          </a:fontRef>
+        </p:style>
+      </p:cxnSp>
+      <p:cxnSp>
+        <p:nvCxnSpPr>
+          <p:cNvPr id="81" name="Straight Connector 80">
+            <a:extLst>
+              <a:ext uri="{FF2B5EF4-FFF2-40B4-BE49-F238E27FC236}">
+                <a16:creationId xmlns:a16="http://schemas.microsoft.com/office/drawing/2014/main" id="{39DEDD6A-4388-4B43-A008-7A4DADC881B4}"/>
+              </a:ext>
+            </a:extLst>
+          </p:cNvPr>
+          <p:cNvCxnSpPr>
+            <a:stCxn id="32" idx="4"/>
+            <a:endCxn id="31" idx="0"/>
+          </p:cNvCxnSpPr>
+          <p:nvPr/>
+        </p:nvCxnSpPr>
+        <p:spPr>
+          <a:xfrm flipH="1">
+            <a:off x="6265871" y="3589988"/>
+            <a:ext cx="28244" cy="221981"/>
+          </a:xfrm>
+          <a:prstGeom prst="line">
+            <a:avLst/>
+          </a:prstGeom>
+          <a:ln w="19050"/>
+        </p:spPr>
+        <p:style>
+          <a:lnRef idx="1">
+            <a:schemeClr val="accent1"/>
+          </a:lnRef>
+          <a:fillRef idx="0">
+            <a:schemeClr val="accent1"/>
+          </a:fillRef>
+          <a:effectRef idx="0">
+            <a:schemeClr val="accent1"/>
+          </a:effectRef>
+          <a:fontRef idx="minor">
+            <a:schemeClr val="tx1"/>
+          </a:fontRef>
+        </p:style>
+      </p:cxnSp>
+      <p:cxnSp>
+        <p:nvCxnSpPr>
+          <p:cNvPr id="83" name="Straight Connector 82">
+            <a:extLst>
+              <a:ext uri="{FF2B5EF4-FFF2-40B4-BE49-F238E27FC236}">
+                <a16:creationId xmlns:a16="http://schemas.microsoft.com/office/drawing/2014/main" id="{93F48A8F-9C11-B848-8331-F8D17961F8BD}"/>
+              </a:ext>
+            </a:extLst>
+          </p:cNvPr>
+          <p:cNvCxnSpPr>
+            <a:cxnSpLocks/>
+            <a:stCxn id="31" idx="3"/>
+            <a:endCxn id="34" idx="0"/>
+          </p:cNvCxnSpPr>
+          <p:nvPr/>
+        </p:nvCxnSpPr>
+        <p:spPr>
+          <a:xfrm flipH="1">
+            <a:off x="5881089" y="3968067"/>
+            <a:ext cx="320124" cy="913130"/>
+          </a:xfrm>
+          <a:prstGeom prst="line">
+            <a:avLst/>
+          </a:prstGeom>
+          <a:ln w="19050"/>
+        </p:spPr>
+        <p:style>
+          <a:lnRef idx="1">
+            <a:schemeClr val="accent1"/>
+          </a:lnRef>
+          <a:fillRef idx="0">
+            <a:schemeClr val="accent1"/>
+          </a:fillRef>
+          <a:effectRef idx="0">
+            <a:schemeClr val="accent1"/>
+          </a:effectRef>
+          <a:fontRef idx="minor">
+            <a:schemeClr val="tx1"/>
+          </a:fontRef>
+        </p:style>
+      </p:cxnSp>
+      <p:sp>
+        <p:nvSpPr>
+          <p:cNvPr id="33" name="Oval 32">
+            <a:extLst>
+              <a:ext uri="{FF2B5EF4-FFF2-40B4-BE49-F238E27FC236}">
+                <a16:creationId xmlns:a16="http://schemas.microsoft.com/office/drawing/2014/main" id="{4A0A421C-CD70-984F-B31D-966A8ECA00ED}"/>
+              </a:ext>
+            </a:extLst>
+          </p:cNvPr>
+          <p:cNvSpPr>
+            <a:spLocks noChangeAspect="1"/>
+          </p:cNvSpPr>
+          <p:nvPr/>
+        </p:nvSpPr>
+        <p:spPr>
+          <a:xfrm>
+            <a:off x="6019795" y="4165372"/>
+            <a:ext cx="182880" cy="182880"/>
+          </a:xfrm>
+          <a:prstGeom prst="ellipse">
+            <a:avLst/>
+          </a:prstGeom>
+          <a:ln>
+            <a:noFill/>
+          </a:ln>
+        </p:spPr>
+        <p:style>
+          <a:lnRef idx="2">
+            <a:schemeClr val="accent1">
+              <a:shade val="50000"/>
+            </a:schemeClr>
+          </a:lnRef>
+          <a:fillRef idx="1">
+            <a:schemeClr val="accent1"/>
+          </a:fillRef>
+          <a:effectRef idx="0">
+            <a:schemeClr val="accent1"/>
+          </a:effectRef>
+          <a:fontRef idx="minor">
+            <a:schemeClr val="lt1"/>
+          </a:fontRef>
+        </p:style>
+        <p:txBody>
+          <a:bodyPr rtlCol="0" anchor="ctr"/>
+          <a:lstStyle/>
+          <a:p>
+            <a:pPr algn="ctr"/>
+            <a:r>
+              <a:rPr lang="en-US" sz="800" dirty="0"/>
+              <a:t>27</a:t>
+            </a:r>
+          </a:p>
+        </p:txBody>
+      </p:sp>
+      <p:cxnSp>
+        <p:nvCxnSpPr>
+          <p:cNvPr id="89" name="Straight Connector 88">
+            <a:extLst>
+              <a:ext uri="{FF2B5EF4-FFF2-40B4-BE49-F238E27FC236}">
+                <a16:creationId xmlns:a16="http://schemas.microsoft.com/office/drawing/2014/main" id="{D3C07CBA-0719-F443-A627-B3C454048754}"/>
+              </a:ext>
+            </a:extLst>
+          </p:cNvPr>
+          <p:cNvCxnSpPr>
+            <a:stCxn id="34" idx="4"/>
+            <a:endCxn id="36" idx="1"/>
+          </p:cNvCxnSpPr>
+          <p:nvPr/>
+        </p:nvCxnSpPr>
+        <p:spPr>
+          <a:xfrm flipH="1">
+            <a:off x="5775198" y="5064077"/>
+            <a:ext cx="105891" cy="824482"/>
+          </a:xfrm>
+          <a:prstGeom prst="line">
+            <a:avLst/>
+          </a:prstGeom>
+          <a:ln w="19050"/>
+        </p:spPr>
+        <p:style>
+          <a:lnRef idx="1">
+            <a:schemeClr val="accent1"/>
+          </a:lnRef>
+          <a:fillRef idx="0">
+            <a:schemeClr val="accent1"/>
+          </a:fillRef>
+          <a:effectRef idx="0">
+            <a:schemeClr val="accent1"/>
+          </a:effectRef>
+          <a:fontRef idx="minor">
+            <a:schemeClr val="tx1"/>
+          </a:fontRef>
+        </p:style>
+      </p:cxnSp>
+      <p:cxnSp>
+        <p:nvCxnSpPr>
+          <p:cNvPr id="91" name="Straight Connector 90">
+            <a:extLst>
+              <a:ext uri="{FF2B5EF4-FFF2-40B4-BE49-F238E27FC236}">
+                <a16:creationId xmlns:a16="http://schemas.microsoft.com/office/drawing/2014/main" id="{14C9C75A-262C-4345-8F7C-94F9E6041993}"/>
+              </a:ext>
+            </a:extLst>
+          </p:cNvPr>
+          <p:cNvCxnSpPr>
+            <a:stCxn id="35" idx="6"/>
+          </p:cNvCxnSpPr>
+          <p:nvPr/>
+        </p:nvCxnSpPr>
+        <p:spPr>
+          <a:xfrm>
+            <a:off x="5956974" y="5393355"/>
+            <a:ext cx="775276" cy="292635"/>
+          </a:xfrm>
+          <a:prstGeom prst="line">
+            <a:avLst/>
+          </a:prstGeom>
+          <a:ln w="19050"/>
+        </p:spPr>
+        <p:style>
+          <a:lnRef idx="1">
+            <a:schemeClr val="accent1"/>
+          </a:lnRef>
+          <a:fillRef idx="0">
+            <a:schemeClr val="accent1"/>
+          </a:fillRef>
+          <a:effectRef idx="0">
+            <a:schemeClr val="accent1"/>
+          </a:effectRef>
+          <a:fontRef idx="minor">
+            <a:schemeClr val="tx1"/>
+          </a:fontRef>
+        </p:style>
+      </p:cxnSp>
+      <p:sp>
+        <p:nvSpPr>
+          <p:cNvPr id="37" name="Oval 36">
+            <a:extLst>
+              <a:ext uri="{FF2B5EF4-FFF2-40B4-BE49-F238E27FC236}">
+                <a16:creationId xmlns:a16="http://schemas.microsoft.com/office/drawing/2014/main" id="{903F61EF-C446-7B45-BB02-AD8245676E70}"/>
+              </a:ext>
+            </a:extLst>
+          </p:cNvPr>
+          <p:cNvSpPr>
+            <a:spLocks noChangeAspect="1"/>
+          </p:cNvSpPr>
+          <p:nvPr/>
+        </p:nvSpPr>
+        <p:spPr>
+          <a:xfrm>
+            <a:off x="6265871" y="5464290"/>
+            <a:ext cx="182880" cy="182880"/>
+          </a:xfrm>
+          <a:prstGeom prst="ellipse">
+            <a:avLst/>
+          </a:prstGeom>
+          <a:ln>
+            <a:noFill/>
+          </a:ln>
+        </p:spPr>
+        <p:style>
+          <a:lnRef idx="2">
+            <a:schemeClr val="accent1">
+              <a:shade val="50000"/>
+            </a:schemeClr>
+          </a:lnRef>
+          <a:fillRef idx="1">
+            <a:schemeClr val="accent1"/>
+          </a:fillRef>
+          <a:effectRef idx="0">
+            <a:schemeClr val="accent1"/>
+          </a:effectRef>
+          <a:fontRef idx="minor">
+            <a:schemeClr val="lt1"/>
+          </a:fontRef>
+        </p:style>
+        <p:txBody>
+          <a:bodyPr rtlCol="0" anchor="ctr"/>
+          <a:lstStyle/>
+          <a:p>
+            <a:pPr algn="ctr"/>
+            <a:r>
+              <a:rPr lang="en-US" sz="800" dirty="0"/>
+              <a:t>31</a:t>
+            </a:r>
+          </a:p>
+        </p:txBody>
+      </p:sp>
+      <p:cxnSp>
+        <p:nvCxnSpPr>
+          <p:cNvPr id="93" name="Straight Connector 92">
+            <a:extLst>
+              <a:ext uri="{FF2B5EF4-FFF2-40B4-BE49-F238E27FC236}">
+                <a16:creationId xmlns:a16="http://schemas.microsoft.com/office/drawing/2014/main" id="{02FD9369-4DFF-674F-BF0A-B31EABBDF547}"/>
+              </a:ext>
+            </a:extLst>
+          </p:cNvPr>
+          <p:cNvCxnSpPr>
+            <a:stCxn id="23" idx="3"/>
+            <a:endCxn id="39" idx="0"/>
+          </p:cNvCxnSpPr>
+          <p:nvPr/>
+        </p:nvCxnSpPr>
+        <p:spPr>
+          <a:xfrm flipH="1">
+            <a:off x="5016602" y="3060492"/>
+            <a:ext cx="313364" cy="389336"/>
+          </a:xfrm>
+          <a:prstGeom prst="line">
+            <a:avLst/>
+          </a:prstGeom>
+          <a:ln w="19050"/>
+        </p:spPr>
+        <p:style>
+          <a:lnRef idx="1">
+            <a:schemeClr val="accent1"/>
+          </a:lnRef>
+          <a:fillRef idx="0">
+            <a:schemeClr val="accent1"/>
+          </a:fillRef>
+          <a:effectRef idx="0">
+            <a:schemeClr val="accent1"/>
+          </a:effectRef>
+          <a:fontRef idx="minor">
+            <a:schemeClr val="tx1"/>
+          </a:fontRef>
+        </p:style>
+      </p:cxnSp>
+      <p:cxnSp>
+        <p:nvCxnSpPr>
+          <p:cNvPr id="95" name="Straight Connector 94">
+            <a:extLst>
+              <a:ext uri="{FF2B5EF4-FFF2-40B4-BE49-F238E27FC236}">
+                <a16:creationId xmlns:a16="http://schemas.microsoft.com/office/drawing/2014/main" id="{CE874CBB-3933-7442-B0DF-4BD53FA4F99F}"/>
+              </a:ext>
+            </a:extLst>
+          </p:cNvPr>
+          <p:cNvCxnSpPr>
+            <a:stCxn id="23" idx="4"/>
+            <a:endCxn id="25" idx="0"/>
+          </p:cNvCxnSpPr>
+          <p:nvPr/>
+        </p:nvCxnSpPr>
+        <p:spPr>
+          <a:xfrm flipH="1">
+            <a:off x="5350422" y="3087274"/>
+            <a:ext cx="44202" cy="541815"/>
+          </a:xfrm>
+          <a:prstGeom prst="line">
+            <a:avLst/>
+          </a:prstGeom>
+          <a:ln w="19050"/>
+        </p:spPr>
+        <p:style>
+          <a:lnRef idx="1">
+            <a:schemeClr val="accent1"/>
+          </a:lnRef>
+          <a:fillRef idx="0">
+            <a:schemeClr val="accent1"/>
+          </a:fillRef>
+          <a:effectRef idx="0">
+            <a:schemeClr val="accent1"/>
+          </a:effectRef>
+          <a:fontRef idx="minor">
+            <a:schemeClr val="tx1"/>
+          </a:fontRef>
+        </p:style>
+      </p:cxnSp>
+      <p:cxnSp>
+        <p:nvCxnSpPr>
+          <p:cNvPr id="97" name="Straight Connector 96">
+            <a:extLst>
+              <a:ext uri="{FF2B5EF4-FFF2-40B4-BE49-F238E27FC236}">
+                <a16:creationId xmlns:a16="http://schemas.microsoft.com/office/drawing/2014/main" id="{73FBB59B-0735-054C-8596-B26F017AB52C}"/>
+              </a:ext>
+            </a:extLst>
+          </p:cNvPr>
+          <p:cNvCxnSpPr>
+            <a:stCxn id="39" idx="4"/>
+            <a:endCxn id="26" idx="1"/>
+          </p:cNvCxnSpPr>
+          <p:nvPr/>
+        </p:nvCxnSpPr>
+        <p:spPr>
+          <a:xfrm>
+            <a:off x="5016602" y="3632708"/>
+            <a:ext cx="177722" cy="414727"/>
+          </a:xfrm>
+          <a:prstGeom prst="line">
+            <a:avLst/>
+          </a:prstGeom>
+          <a:ln w="19050"/>
+        </p:spPr>
+        <p:style>
+          <a:lnRef idx="1">
+            <a:schemeClr val="accent1"/>
+          </a:lnRef>
+          <a:fillRef idx="0">
+            <a:schemeClr val="accent1"/>
+          </a:fillRef>
+          <a:effectRef idx="0">
+            <a:schemeClr val="accent1"/>
+          </a:effectRef>
+          <a:fontRef idx="minor">
+            <a:schemeClr val="tx1"/>
+          </a:fontRef>
+        </p:style>
+      </p:cxnSp>
+      <p:cxnSp>
+        <p:nvCxnSpPr>
+          <p:cNvPr id="99" name="Straight Connector 98">
+            <a:extLst>
+              <a:ext uri="{FF2B5EF4-FFF2-40B4-BE49-F238E27FC236}">
+                <a16:creationId xmlns:a16="http://schemas.microsoft.com/office/drawing/2014/main" id="{9424E919-1258-F340-84CB-715BEFD7F64E}"/>
+              </a:ext>
+            </a:extLst>
+          </p:cNvPr>
+          <p:cNvCxnSpPr>
+            <a:stCxn id="25" idx="4"/>
+            <a:endCxn id="26" idx="7"/>
+          </p:cNvCxnSpPr>
+          <p:nvPr/>
+        </p:nvCxnSpPr>
+        <p:spPr>
+          <a:xfrm flipH="1">
+            <a:off x="5323640" y="3811969"/>
+            <a:ext cx="26782" cy="235466"/>
+          </a:xfrm>
+          <a:prstGeom prst="line">
+            <a:avLst/>
+          </a:prstGeom>
+          <a:ln w="19050"/>
+        </p:spPr>
+        <p:style>
+          <a:lnRef idx="1">
+            <a:schemeClr val="accent1"/>
+          </a:lnRef>
+          <a:fillRef idx="0">
+            <a:schemeClr val="accent1"/>
+          </a:fillRef>
+          <a:effectRef idx="0">
+            <a:schemeClr val="accent1"/>
+          </a:effectRef>
+          <a:fontRef idx="minor">
+            <a:schemeClr val="tx1"/>
+          </a:fontRef>
+        </p:style>
+      </p:cxnSp>
+      <p:cxnSp>
+        <p:nvCxnSpPr>
+          <p:cNvPr id="101" name="Straight Connector 100">
+            <a:extLst>
+              <a:ext uri="{FF2B5EF4-FFF2-40B4-BE49-F238E27FC236}">
+                <a16:creationId xmlns:a16="http://schemas.microsoft.com/office/drawing/2014/main" id="{6995859C-7485-954F-8F03-2C59E3E15CB9}"/>
+              </a:ext>
+            </a:extLst>
+          </p:cNvPr>
+          <p:cNvCxnSpPr>
+            <a:cxnSpLocks/>
+          </p:cNvCxnSpPr>
+          <p:nvPr/>
+        </p:nvCxnSpPr>
+        <p:spPr>
+          <a:xfrm>
+            <a:off x="5350422" y="4141247"/>
+            <a:ext cx="669373" cy="86018"/>
+          </a:xfrm>
+          <a:prstGeom prst="line">
+            <a:avLst/>
+          </a:prstGeom>
+          <a:ln w="19050"/>
+        </p:spPr>
+        <p:style>
+          <a:lnRef idx="1">
+            <a:schemeClr val="accent1"/>
+          </a:lnRef>
+          <a:fillRef idx="0">
+            <a:schemeClr val="accent1"/>
+          </a:fillRef>
+          <a:effectRef idx="0">
+            <a:schemeClr val="accent1"/>
+          </a:effectRef>
+          <a:fontRef idx="minor">
+            <a:schemeClr val="tx1"/>
+          </a:fontRef>
+        </p:style>
+      </p:cxnSp>
+      <p:sp>
+        <p:nvSpPr>
+          <p:cNvPr id="27" name="Oval 26">
+            <a:extLst>
+              <a:ext uri="{FF2B5EF4-FFF2-40B4-BE49-F238E27FC236}">
+                <a16:creationId xmlns:a16="http://schemas.microsoft.com/office/drawing/2014/main" id="{ABF8310C-EF4C-664D-8EE0-3519C0D7D191}"/>
+              </a:ext>
+            </a:extLst>
+          </p:cNvPr>
+          <p:cNvSpPr>
+            <a:spLocks noChangeAspect="1"/>
+          </p:cNvSpPr>
+          <p:nvPr/>
+        </p:nvSpPr>
+        <p:spPr>
+          <a:xfrm>
+            <a:off x="5532484" y="4112093"/>
+            <a:ext cx="182880" cy="182880"/>
+          </a:xfrm>
+          <a:prstGeom prst="ellipse">
+            <a:avLst/>
+          </a:prstGeom>
+          <a:ln>
+            <a:noFill/>
+          </a:ln>
+        </p:spPr>
+        <p:style>
+          <a:lnRef idx="2">
+            <a:schemeClr val="accent1">
+              <a:shade val="50000"/>
+            </a:schemeClr>
+          </a:lnRef>
+          <a:fillRef idx="1">
+            <a:schemeClr val="accent1"/>
+          </a:fillRef>
+          <a:effectRef idx="0">
+            <a:schemeClr val="accent1"/>
+          </a:effectRef>
+          <a:fontRef idx="minor">
+            <a:schemeClr val="lt1"/>
+          </a:fontRef>
+        </p:style>
+        <p:txBody>
+          <a:bodyPr rtlCol="0" anchor="ctr"/>
+          <a:lstStyle/>
+          <a:p>
+            <a:pPr algn="ctr"/>
+            <a:r>
+              <a:rPr lang="en-US" sz="800" dirty="0"/>
+              <a:t>24</a:t>
+            </a:r>
+          </a:p>
+        </p:txBody>
+      </p:sp>
+      <p:cxnSp>
+        <p:nvCxnSpPr>
+          <p:cNvPr id="108" name="Straight Connector 107">
+            <a:extLst>
+              <a:ext uri="{FF2B5EF4-FFF2-40B4-BE49-F238E27FC236}">
+                <a16:creationId xmlns:a16="http://schemas.microsoft.com/office/drawing/2014/main" id="{4E2AEE80-B7A4-2D41-9612-57604FE154C1}"/>
+              </a:ext>
+            </a:extLst>
+          </p:cNvPr>
+          <p:cNvCxnSpPr>
+            <a:cxnSpLocks/>
+            <a:stCxn id="31" idx="6"/>
+          </p:cNvCxnSpPr>
+          <p:nvPr/>
+        </p:nvCxnSpPr>
+        <p:spPr>
+          <a:xfrm flipV="1">
+            <a:off x="6357311" y="3850560"/>
+            <a:ext cx="374939" cy="52849"/>
+          </a:xfrm>
+          <a:prstGeom prst="line">
+            <a:avLst/>
+          </a:prstGeom>
+          <a:ln w="19050"/>
+        </p:spPr>
+        <p:style>
+          <a:lnRef idx="1">
+            <a:schemeClr val="accent1"/>
+          </a:lnRef>
+          <a:fillRef idx="0">
+            <a:schemeClr val="accent1"/>
+          </a:fillRef>
+          <a:effectRef idx="0">
+            <a:schemeClr val="accent1"/>
+          </a:effectRef>
+          <a:fontRef idx="minor">
+            <a:schemeClr val="tx1"/>
+          </a:fontRef>
+        </p:style>
+      </p:cxnSp>
+      <p:sp>
+        <p:nvSpPr>
+          <p:cNvPr id="20" name="Oval 19">
+            <a:extLst>
+              <a:ext uri="{FF2B5EF4-FFF2-40B4-BE49-F238E27FC236}">
+                <a16:creationId xmlns:a16="http://schemas.microsoft.com/office/drawing/2014/main" id="{BFC2E4D5-B471-AB43-B4E5-F213182E9A32}"/>
+              </a:ext>
+            </a:extLst>
+          </p:cNvPr>
+          <p:cNvSpPr>
+            <a:spLocks noChangeAspect="1"/>
+          </p:cNvSpPr>
+          <p:nvPr/>
+        </p:nvSpPr>
+        <p:spPr>
+          <a:xfrm>
+            <a:off x="6417447" y="2180127"/>
+            <a:ext cx="182880" cy="182880"/>
+          </a:xfrm>
+          <a:prstGeom prst="ellipse">
+            <a:avLst/>
+          </a:prstGeom>
+          <a:ln>
+            <a:noFill/>
+          </a:ln>
+        </p:spPr>
+        <p:style>
+          <a:lnRef idx="2">
+            <a:schemeClr val="accent1">
+              <a:shade val="50000"/>
+            </a:schemeClr>
+          </a:lnRef>
+          <a:fillRef idx="1">
+            <a:schemeClr val="accent1"/>
+          </a:fillRef>
+          <a:effectRef idx="0">
+            <a:schemeClr val="accent1"/>
+          </a:effectRef>
+          <a:fontRef idx="minor">
+            <a:schemeClr val="lt1"/>
+          </a:fontRef>
+        </p:style>
+        <p:txBody>
+          <a:bodyPr rtlCol="0" anchor="ctr"/>
+          <a:lstStyle/>
+          <a:p>
+            <a:pPr algn="ctr"/>
+            <a:r>
+              <a:rPr lang="en-US" sz="800" dirty="0"/>
+              <a:t>13</a:t>
+            </a:r>
+          </a:p>
+        </p:txBody>
+      </p:sp>
+      <p:sp>
+        <p:nvSpPr>
+          <p:cNvPr id="35" name="Oval 34">
+            <a:extLst>
+              <a:ext uri="{FF2B5EF4-FFF2-40B4-BE49-F238E27FC236}">
+                <a16:creationId xmlns:a16="http://schemas.microsoft.com/office/drawing/2014/main" id="{969BB5F7-3946-B44B-B5DC-1666B3DBCA82}"/>
+              </a:ext>
+            </a:extLst>
+          </p:cNvPr>
+          <p:cNvSpPr>
+            <a:spLocks noChangeAspect="1"/>
+          </p:cNvSpPr>
+          <p:nvPr/>
+        </p:nvSpPr>
+        <p:spPr>
+          <a:xfrm>
+            <a:off x="5774094" y="5301915"/>
+            <a:ext cx="182880" cy="182880"/>
+          </a:xfrm>
+          <a:prstGeom prst="ellipse">
+            <a:avLst/>
+          </a:prstGeom>
+          <a:ln>
+            <a:noFill/>
+          </a:ln>
+        </p:spPr>
+        <p:style>
+          <a:lnRef idx="2">
+            <a:schemeClr val="accent1">
+              <a:shade val="50000"/>
+            </a:schemeClr>
+          </a:lnRef>
+          <a:fillRef idx="1">
+            <a:schemeClr val="accent1"/>
+          </a:fillRef>
+          <a:effectRef idx="0">
+            <a:schemeClr val="accent1"/>
+          </a:effectRef>
+          <a:fontRef idx="minor">
+            <a:schemeClr val="lt1"/>
+          </a:fontRef>
+        </p:style>
+        <p:txBody>
+          <a:bodyPr rtlCol="0" anchor="ctr"/>
+          <a:lstStyle/>
+          <a:p>
+            <a:pPr algn="ctr"/>
+            <a:r>
+              <a:rPr lang="en-US" sz="800" dirty="0"/>
+              <a:t>29</a:t>
+            </a:r>
+          </a:p>
+        </p:txBody>
+      </p:sp>
+      <p:sp>
+        <p:nvSpPr>
+          <p:cNvPr id="25" name="Oval 24">
+            <a:extLst>
+              <a:ext uri="{FF2B5EF4-FFF2-40B4-BE49-F238E27FC236}">
+                <a16:creationId xmlns:a16="http://schemas.microsoft.com/office/drawing/2014/main" id="{7F142E62-BB62-9D4C-8752-4EFCA85BBEA8}"/>
+              </a:ext>
+            </a:extLst>
+          </p:cNvPr>
+          <p:cNvSpPr>
+            <a:spLocks noChangeAspect="1"/>
+          </p:cNvSpPr>
+          <p:nvPr/>
+        </p:nvSpPr>
+        <p:spPr>
+          <a:xfrm>
+            <a:off x="5258982" y="3629089"/>
+            <a:ext cx="182880" cy="182880"/>
+          </a:xfrm>
+          <a:prstGeom prst="ellipse">
+            <a:avLst/>
+          </a:prstGeom>
+          <a:ln>
+            <a:noFill/>
+          </a:ln>
+        </p:spPr>
+        <p:style>
+          <a:lnRef idx="2">
+            <a:schemeClr val="accent1">
+              <a:shade val="50000"/>
+            </a:schemeClr>
+          </a:lnRef>
+          <a:fillRef idx="1">
+            <a:schemeClr val="accent1"/>
+          </a:fillRef>
+          <a:effectRef idx="0">
+            <a:schemeClr val="accent1"/>
+          </a:effectRef>
+          <a:fontRef idx="minor">
+            <a:schemeClr val="lt1"/>
+          </a:fontRef>
+        </p:style>
+        <p:txBody>
+          <a:bodyPr rtlCol="0" anchor="ctr"/>
+          <a:lstStyle/>
+          <a:p>
+            <a:pPr algn="ctr"/>
+            <a:r>
+              <a:rPr lang="en-US" sz="800" dirty="0"/>
+              <a:t>20</a:t>
+            </a:r>
+          </a:p>
+        </p:txBody>
+      </p:sp>
+      <p:cxnSp>
+        <p:nvCxnSpPr>
+          <p:cNvPr id="13" name="Straight Connector 12">
+            <a:extLst>
+              <a:ext uri="{FF2B5EF4-FFF2-40B4-BE49-F238E27FC236}">
+                <a16:creationId xmlns:a16="http://schemas.microsoft.com/office/drawing/2014/main" id="{C311B2DC-C053-F44C-BEED-06B329BC825D}"/>
+              </a:ext>
+            </a:extLst>
+          </p:cNvPr>
+          <p:cNvCxnSpPr>
+            <a:cxnSpLocks/>
+            <a:stCxn id="39" idx="6"/>
+            <a:endCxn id="25" idx="2"/>
+          </p:cNvCxnSpPr>
+          <p:nvPr/>
+        </p:nvCxnSpPr>
+        <p:spPr>
+          <a:xfrm>
+            <a:off x="5108042" y="3541268"/>
+            <a:ext cx="150940" cy="179261"/>
+          </a:xfrm>
+          <a:prstGeom prst="line">
+            <a:avLst/>
+          </a:prstGeom>
+          <a:ln w="19050"/>
+        </p:spPr>
+        <p:style>
+          <a:lnRef idx="1">
+            <a:schemeClr val="accent1"/>
+          </a:lnRef>
+          <a:fillRef idx="0">
+            <a:schemeClr val="accent1"/>
+          </a:fillRef>
+          <a:effectRef idx="0">
+            <a:schemeClr val="accent1"/>
+          </a:effectRef>
+          <a:fontRef idx="minor">
+            <a:schemeClr val="tx1"/>
+          </a:fontRef>
+        </p:style>
+      </p:cxnSp>
+      <p:sp>
+        <p:nvSpPr>
+          <p:cNvPr id="12" name="Oval 11">
+            <a:extLst>
+              <a:ext uri="{FF2B5EF4-FFF2-40B4-BE49-F238E27FC236}">
+                <a16:creationId xmlns:a16="http://schemas.microsoft.com/office/drawing/2014/main" id="{1AC7CE53-61A9-FD49-817A-084078F5E341}"/>
+              </a:ext>
+            </a:extLst>
+          </p:cNvPr>
+          <p:cNvSpPr>
+            <a:spLocks noChangeAspect="1"/>
+          </p:cNvSpPr>
+          <p:nvPr/>
+        </p:nvSpPr>
+        <p:spPr>
+          <a:xfrm>
+            <a:off x="4725279" y="2179182"/>
+            <a:ext cx="182880" cy="182880"/>
+          </a:xfrm>
+          <a:prstGeom prst="ellipse">
+            <a:avLst/>
+          </a:prstGeom>
+          <a:ln>
+            <a:noFill/>
+          </a:ln>
+        </p:spPr>
+        <p:style>
+          <a:lnRef idx="2">
+            <a:schemeClr val="accent1">
+              <a:shade val="50000"/>
+            </a:schemeClr>
+          </a:lnRef>
+          <a:fillRef idx="1">
+            <a:schemeClr val="accent1"/>
+          </a:fillRef>
+          <a:effectRef idx="0">
+            <a:schemeClr val="accent1"/>
+          </a:effectRef>
+          <a:fontRef idx="minor">
+            <a:schemeClr val="lt1"/>
+          </a:fontRef>
+        </p:style>
+        <p:txBody>
+          <a:bodyPr rtlCol="0" anchor="ctr"/>
+          <a:lstStyle/>
+          <a:p>
+            <a:pPr algn="ctr"/>
+            <a:r>
+              <a:rPr lang="en-US" sz="800" dirty="0"/>
+              <a:t>X1</a:t>
+            </a:r>
+          </a:p>
+        </p:txBody>
+      </p:sp>
+      <p:cxnSp>
+        <p:nvCxnSpPr>
+          <p:cNvPr id="15" name="Straight Connector 14">
+            <a:extLst>
+              <a:ext uri="{FF2B5EF4-FFF2-40B4-BE49-F238E27FC236}">
+                <a16:creationId xmlns:a16="http://schemas.microsoft.com/office/drawing/2014/main" id="{2BBE465E-2EC0-3E48-933F-1166203F1D5E}"/>
+              </a:ext>
+            </a:extLst>
+          </p:cNvPr>
+          <p:cNvCxnSpPr>
+            <a:cxnSpLocks/>
+            <a:endCxn id="12" idx="0"/>
+          </p:cNvCxnSpPr>
+          <p:nvPr/>
+        </p:nvCxnSpPr>
+        <p:spPr>
+          <a:xfrm>
+            <a:off x="4725279" y="1597149"/>
+            <a:ext cx="91440" cy="582033"/>
+          </a:xfrm>
+          <a:prstGeom prst="line">
+            <a:avLst/>
+          </a:prstGeom>
+          <a:ln w="19050"/>
+        </p:spPr>
+        <p:style>
+          <a:lnRef idx="1">
+            <a:schemeClr val="accent1"/>
+          </a:lnRef>
+          <a:fillRef idx="0">
+            <a:schemeClr val="accent1"/>
+          </a:fillRef>
+          <a:effectRef idx="0">
+            <a:schemeClr val="accent1"/>
+          </a:effectRef>
+          <a:fontRef idx="minor">
+            <a:schemeClr val="tx1"/>
+          </a:fontRef>
+        </p:style>
+      </p:cxnSp>
+      <p:cxnSp>
+        <p:nvCxnSpPr>
+          <p:cNvPr id="41" name="Straight Connector 40">
+            <a:extLst>
+              <a:ext uri="{FF2B5EF4-FFF2-40B4-BE49-F238E27FC236}">
+                <a16:creationId xmlns:a16="http://schemas.microsoft.com/office/drawing/2014/main" id="{8588BC29-65B5-1E49-B04F-E273DC7401BC}"/>
+              </a:ext>
+            </a:extLst>
+          </p:cNvPr>
+          <p:cNvCxnSpPr>
+            <a:stCxn id="12" idx="4"/>
+            <a:endCxn id="24" idx="0"/>
+          </p:cNvCxnSpPr>
+          <p:nvPr/>
+        </p:nvCxnSpPr>
+        <p:spPr>
+          <a:xfrm>
+            <a:off x="4816719" y="2362062"/>
+            <a:ext cx="91440" cy="542332"/>
+          </a:xfrm>
+          <a:prstGeom prst="line">
+            <a:avLst/>
+          </a:prstGeom>
+          <a:ln w="19050"/>
+        </p:spPr>
+        <p:style>
+          <a:lnRef idx="1">
+            <a:schemeClr val="accent1"/>
+          </a:lnRef>
+          <a:fillRef idx="0">
+            <a:schemeClr val="accent1"/>
+          </a:fillRef>
+          <a:effectRef idx="0">
+            <a:schemeClr val="accent1"/>
+          </a:effectRef>
+          <a:fontRef idx="minor">
+            <a:schemeClr val="tx1"/>
+          </a:fontRef>
+        </p:style>
+      </p:cxnSp>
+      <p:sp>
+        <p:nvSpPr>
+          <p:cNvPr id="62" name="Oval 61">
+            <a:extLst>
+              <a:ext uri="{FF2B5EF4-FFF2-40B4-BE49-F238E27FC236}">
+                <a16:creationId xmlns:a16="http://schemas.microsoft.com/office/drawing/2014/main" id="{1417671B-473E-FB45-810F-0F3055C65AFB}"/>
+              </a:ext>
+            </a:extLst>
+          </p:cNvPr>
+          <p:cNvSpPr>
+            <a:spLocks noChangeAspect="1"/>
+          </p:cNvSpPr>
+          <p:nvPr/>
+        </p:nvSpPr>
+        <p:spPr>
+          <a:xfrm>
+            <a:off x="5804836" y="2177888"/>
+            <a:ext cx="182880" cy="182880"/>
+          </a:xfrm>
+          <a:prstGeom prst="ellipse">
+            <a:avLst/>
+          </a:prstGeom>
+          <a:ln>
+            <a:noFill/>
+          </a:ln>
+        </p:spPr>
+        <p:style>
+          <a:lnRef idx="2">
+            <a:schemeClr val="accent1">
+              <a:shade val="50000"/>
+            </a:schemeClr>
+          </a:lnRef>
+          <a:fillRef idx="1">
+            <a:schemeClr val="accent1"/>
+          </a:fillRef>
+          <a:effectRef idx="0">
+            <a:schemeClr val="accent1"/>
+          </a:effectRef>
+          <a:fontRef idx="minor">
+            <a:schemeClr val="lt1"/>
+          </a:fontRef>
+        </p:style>
+        <p:txBody>
+          <a:bodyPr rtlCol="0" anchor="ctr"/>
+          <a:lstStyle/>
+          <a:p>
+            <a:pPr algn="ctr"/>
+            <a:r>
+              <a:rPr lang="en-US" sz="800" dirty="0"/>
+              <a:t>X2</a:t>
+            </a:r>
+          </a:p>
+        </p:txBody>
+      </p:sp>
+      <p:cxnSp>
+        <p:nvCxnSpPr>
+          <p:cNvPr id="43" name="Straight Connector 42">
+            <a:extLst>
+              <a:ext uri="{FF2B5EF4-FFF2-40B4-BE49-F238E27FC236}">
+                <a16:creationId xmlns:a16="http://schemas.microsoft.com/office/drawing/2014/main" id="{9AADD11E-6B71-B34E-900D-64F3C7184E65}"/>
+              </a:ext>
+            </a:extLst>
+          </p:cNvPr>
+          <p:cNvCxnSpPr>
+            <a:cxnSpLocks/>
+            <a:stCxn id="17" idx="4"/>
+            <a:endCxn id="62" idx="0"/>
+          </p:cNvCxnSpPr>
+          <p:nvPr/>
+        </p:nvCxnSpPr>
+        <p:spPr>
+          <a:xfrm>
+            <a:off x="5789649" y="1688589"/>
+            <a:ext cx="106627" cy="489299"/>
+          </a:xfrm>
+          <a:prstGeom prst="line">
+            <a:avLst/>
+          </a:prstGeom>
+          <a:ln w="19050"/>
+        </p:spPr>
+        <p:style>
+          <a:lnRef idx="1">
+            <a:schemeClr val="accent1"/>
+          </a:lnRef>
+          <a:fillRef idx="0">
+            <a:schemeClr val="accent1"/>
+          </a:fillRef>
+          <a:effectRef idx="0">
+            <a:schemeClr val="accent1"/>
+          </a:effectRef>
+          <a:fontRef idx="minor">
+            <a:schemeClr val="tx1"/>
+          </a:fontRef>
+        </p:style>
+      </p:cxnSp>
+      <p:cxnSp>
+        <p:nvCxnSpPr>
+          <p:cNvPr id="45" name="Straight Connector 44">
+            <a:extLst>
+              <a:ext uri="{FF2B5EF4-FFF2-40B4-BE49-F238E27FC236}">
+                <a16:creationId xmlns:a16="http://schemas.microsoft.com/office/drawing/2014/main" id="{580D26B8-1549-544B-8B29-FFB4041EA6A5}"/>
+              </a:ext>
+            </a:extLst>
+          </p:cNvPr>
+          <p:cNvCxnSpPr>
+            <a:stCxn id="62" idx="4"/>
+            <a:endCxn id="22" idx="0"/>
+          </p:cNvCxnSpPr>
+          <p:nvPr/>
+        </p:nvCxnSpPr>
+        <p:spPr>
+          <a:xfrm>
+            <a:off x="5896276" y="2360768"/>
+            <a:ext cx="76253" cy="543626"/>
+          </a:xfrm>
+          <a:prstGeom prst="line">
+            <a:avLst/>
+          </a:prstGeom>
+          <a:ln w="19050"/>
+        </p:spPr>
+        <p:style>
+          <a:lnRef idx="1">
+            <a:schemeClr val="accent1"/>
+          </a:lnRef>
+          <a:fillRef idx="0">
+            <a:schemeClr val="accent1"/>
+          </a:fillRef>
+          <a:effectRef idx="0">
+            <a:schemeClr val="accent1"/>
+          </a:effectRef>
+          <a:fontRef idx="minor">
+            <a:schemeClr val="tx1"/>
+          </a:fontRef>
+        </p:style>
+      </p:cxnSp>
+      <p:sp>
+        <p:nvSpPr>
+          <p:cNvPr id="68" name="Oval 67">
+            <a:extLst>
+              <a:ext uri="{FF2B5EF4-FFF2-40B4-BE49-F238E27FC236}">
+                <a16:creationId xmlns:a16="http://schemas.microsoft.com/office/drawing/2014/main" id="{BF0D8359-78BE-2F4B-A385-143266BD6A44}"/>
+              </a:ext>
+            </a:extLst>
+          </p:cNvPr>
+          <p:cNvSpPr>
+            <a:spLocks noChangeAspect="1"/>
+          </p:cNvSpPr>
+          <p:nvPr/>
+        </p:nvSpPr>
+        <p:spPr>
+          <a:xfrm>
+            <a:off x="7062543" y="2176272"/>
+            <a:ext cx="182880" cy="182880"/>
+          </a:xfrm>
+          <a:prstGeom prst="ellipse">
+            <a:avLst/>
+          </a:prstGeom>
+          <a:ln>
+            <a:noFill/>
+          </a:ln>
+        </p:spPr>
+        <p:style>
+          <a:lnRef idx="2">
+            <a:schemeClr val="accent1">
+              <a:shade val="50000"/>
+            </a:schemeClr>
+          </a:lnRef>
+          <a:fillRef idx="1">
+            <a:schemeClr val="accent1"/>
+          </a:fillRef>
+          <a:effectRef idx="0">
+            <a:schemeClr val="accent1"/>
+          </a:effectRef>
+          <a:fontRef idx="minor">
+            <a:schemeClr val="lt1"/>
+          </a:fontRef>
+        </p:style>
+        <p:txBody>
+          <a:bodyPr rtlCol="0" anchor="ctr"/>
+          <a:lstStyle/>
+          <a:p>
+            <a:pPr algn="ctr"/>
+            <a:r>
+              <a:rPr lang="en-US" sz="800" dirty="0"/>
+              <a:t>X3</a:t>
+            </a:r>
+          </a:p>
+        </p:txBody>
+      </p:sp>
+      <p:cxnSp>
+        <p:nvCxnSpPr>
+          <p:cNvPr id="49" name="Straight Connector 48">
+            <a:extLst>
+              <a:ext uri="{FF2B5EF4-FFF2-40B4-BE49-F238E27FC236}">
+                <a16:creationId xmlns:a16="http://schemas.microsoft.com/office/drawing/2014/main" id="{5554BFBD-8F35-D543-B5F6-9958FC0189D8}"/>
+              </a:ext>
+            </a:extLst>
+          </p:cNvPr>
+          <p:cNvCxnSpPr>
+            <a:stCxn id="10" idx="4"/>
+            <a:endCxn id="68" idx="0"/>
+          </p:cNvCxnSpPr>
+          <p:nvPr/>
+        </p:nvCxnSpPr>
+        <p:spPr>
+          <a:xfrm flipH="1">
+            <a:off x="7153983" y="1743761"/>
+            <a:ext cx="54015" cy="432511"/>
+          </a:xfrm>
+          <a:prstGeom prst="line">
+            <a:avLst/>
+          </a:prstGeom>
+          <a:ln w="19050"/>
+        </p:spPr>
+        <p:style>
+          <a:lnRef idx="1">
+            <a:schemeClr val="accent1"/>
+          </a:lnRef>
+          <a:fillRef idx="0">
+            <a:schemeClr val="accent1"/>
+          </a:fillRef>
+          <a:effectRef idx="0">
+            <a:schemeClr val="accent1"/>
+          </a:effectRef>
+          <a:fontRef idx="minor">
+            <a:schemeClr val="tx1"/>
+          </a:fontRef>
+        </p:style>
+      </p:cxnSp>
+      <p:cxnSp>
+        <p:nvCxnSpPr>
+          <p:cNvPr id="51" name="Straight Connector 50">
+            <a:extLst>
+              <a:ext uri="{FF2B5EF4-FFF2-40B4-BE49-F238E27FC236}">
+                <a16:creationId xmlns:a16="http://schemas.microsoft.com/office/drawing/2014/main" id="{68EE0025-E036-E94A-8DD4-0AF772E26BA3}"/>
+              </a:ext>
+            </a:extLst>
+          </p:cNvPr>
+          <p:cNvCxnSpPr>
+            <a:stCxn id="68" idx="4"/>
+            <a:endCxn id="28" idx="0"/>
+          </p:cNvCxnSpPr>
+          <p:nvPr/>
+        </p:nvCxnSpPr>
+        <p:spPr>
+          <a:xfrm flipH="1">
+            <a:off x="7064058" y="2359152"/>
+            <a:ext cx="89925" cy="536948"/>
+          </a:xfrm>
+          <a:prstGeom prst="line">
+            <a:avLst/>
+          </a:prstGeom>
+          <a:ln w="19050"/>
+        </p:spPr>
+        <p:style>
+          <a:lnRef idx="1">
+            <a:schemeClr val="accent1"/>
+          </a:lnRef>
+          <a:fillRef idx="0">
+            <a:schemeClr val="accent1"/>
+          </a:fillRef>
+          <a:effectRef idx="0">
+            <a:schemeClr val="accent1"/>
+          </a:effectRef>
+          <a:fontRef idx="minor">
+            <a:schemeClr val="tx1"/>
+          </a:fontRef>
+        </p:style>
+      </p:cxnSp>
+      <p:sp>
+        <p:nvSpPr>
+          <p:cNvPr id="74" name="Oval 73">
+            <a:extLst>
+              <a:ext uri="{FF2B5EF4-FFF2-40B4-BE49-F238E27FC236}">
+                <a16:creationId xmlns:a16="http://schemas.microsoft.com/office/drawing/2014/main" id="{31D7F906-F922-DB44-9957-C6D1073B2BF5}"/>
+              </a:ext>
+            </a:extLst>
+          </p:cNvPr>
+          <p:cNvSpPr>
+            <a:spLocks noChangeAspect="1"/>
+          </p:cNvSpPr>
+          <p:nvPr/>
+        </p:nvSpPr>
+        <p:spPr>
+          <a:xfrm>
+            <a:off x="5189643" y="5077762"/>
+            <a:ext cx="182880" cy="182880"/>
+          </a:xfrm>
+          <a:prstGeom prst="ellipse">
+            <a:avLst/>
+          </a:prstGeom>
+          <a:ln>
+            <a:noFill/>
+          </a:ln>
+        </p:spPr>
+        <p:style>
+          <a:lnRef idx="2">
+            <a:schemeClr val="accent1">
+              <a:shade val="50000"/>
+            </a:schemeClr>
+          </a:lnRef>
+          <a:fillRef idx="1">
+            <a:schemeClr val="accent1"/>
+          </a:fillRef>
+          <a:effectRef idx="0">
+            <a:schemeClr val="accent1"/>
+          </a:effectRef>
+          <a:fontRef idx="minor">
+            <a:schemeClr val="lt1"/>
+          </a:fontRef>
+        </p:style>
+        <p:txBody>
+          <a:bodyPr rtlCol="0" anchor="ctr"/>
+          <a:lstStyle/>
+          <a:p>
+            <a:pPr algn="ctr"/>
+            <a:r>
+              <a:rPr lang="en-US" sz="800" dirty="0"/>
+              <a:t>X4</a:t>
+            </a:r>
+          </a:p>
+        </p:txBody>
+      </p:sp>
+      <p:cxnSp>
+        <p:nvCxnSpPr>
+          <p:cNvPr id="53" name="Straight Connector 52">
+            <a:extLst>
+              <a:ext uri="{FF2B5EF4-FFF2-40B4-BE49-F238E27FC236}">
+                <a16:creationId xmlns:a16="http://schemas.microsoft.com/office/drawing/2014/main" id="{44901630-D38D-274F-9809-28EE55C8B5B7}"/>
+              </a:ext>
+            </a:extLst>
+          </p:cNvPr>
+          <p:cNvCxnSpPr>
+            <a:stCxn id="26" idx="4"/>
+            <a:endCxn id="74" idx="0"/>
+          </p:cNvCxnSpPr>
+          <p:nvPr/>
+        </p:nvCxnSpPr>
+        <p:spPr>
+          <a:xfrm>
+            <a:off x="5258982" y="4203533"/>
+            <a:ext cx="22101" cy="874229"/>
+          </a:xfrm>
+          <a:prstGeom prst="line">
+            <a:avLst/>
+          </a:prstGeom>
+          <a:ln w="19050"/>
+        </p:spPr>
+        <p:style>
+          <a:lnRef idx="1">
+            <a:schemeClr val="accent1"/>
+          </a:lnRef>
+          <a:fillRef idx="0">
+            <a:schemeClr val="accent1"/>
+          </a:fillRef>
+          <a:effectRef idx="0">
+            <a:schemeClr val="accent1"/>
+          </a:effectRef>
+          <a:fontRef idx="minor">
+            <a:schemeClr val="tx1"/>
+          </a:fontRef>
+        </p:style>
+      </p:cxnSp>
+      <p:cxnSp>
+        <p:nvCxnSpPr>
+          <p:cNvPr id="56" name="Straight Connector 55">
+            <a:extLst>
+              <a:ext uri="{FF2B5EF4-FFF2-40B4-BE49-F238E27FC236}">
+                <a16:creationId xmlns:a16="http://schemas.microsoft.com/office/drawing/2014/main" id="{B364B121-8284-7E4C-A6A2-E6794B8153A9}"/>
+              </a:ext>
+            </a:extLst>
+          </p:cNvPr>
+          <p:cNvCxnSpPr>
+            <a:cxnSpLocks/>
+            <a:stCxn id="74" idx="6"/>
+            <a:endCxn id="35" idx="1"/>
+          </p:cNvCxnSpPr>
+          <p:nvPr/>
+        </p:nvCxnSpPr>
+        <p:spPr>
+          <a:xfrm>
+            <a:off x="5372523" y="5169202"/>
+            <a:ext cx="428353" cy="159495"/>
+          </a:xfrm>
+          <a:prstGeom prst="line">
+            <a:avLst/>
+          </a:prstGeom>
+          <a:ln w="19050"/>
+        </p:spPr>
+        <p:style>
+          <a:lnRef idx="1">
+            <a:schemeClr val="accent1"/>
+          </a:lnRef>
+          <a:fillRef idx="0">
+            <a:schemeClr val="accent1"/>
+          </a:fillRef>
+          <a:effectRef idx="0">
+            <a:schemeClr val="accent1"/>
+          </a:effectRef>
+          <a:fontRef idx="minor">
+            <a:schemeClr val="tx1"/>
+          </a:fontRef>
+        </p:style>
+      </p:cxnSp>
+      <p:sp>
+        <p:nvSpPr>
+          <p:cNvPr id="84" name="Oval 83">
+            <a:extLst>
+              <a:ext uri="{FF2B5EF4-FFF2-40B4-BE49-F238E27FC236}">
+                <a16:creationId xmlns:a16="http://schemas.microsoft.com/office/drawing/2014/main" id="{FB0A795A-8E44-E742-963B-03AD15020825}"/>
+              </a:ext>
+            </a:extLst>
+          </p:cNvPr>
+          <p:cNvSpPr>
+            <a:spLocks noChangeAspect="1"/>
+          </p:cNvSpPr>
+          <p:nvPr/>
+        </p:nvSpPr>
+        <p:spPr>
+          <a:xfrm>
+            <a:off x="6434518" y="4779364"/>
+            <a:ext cx="182880" cy="182880"/>
+          </a:xfrm>
+          <a:prstGeom prst="ellipse">
+            <a:avLst/>
+          </a:prstGeom>
+          <a:ln>
+            <a:noFill/>
+          </a:ln>
+        </p:spPr>
+        <p:style>
+          <a:lnRef idx="2">
+            <a:schemeClr val="accent1">
+              <a:shade val="50000"/>
+            </a:schemeClr>
+          </a:lnRef>
+          <a:fillRef idx="1">
+            <a:schemeClr val="accent1"/>
+          </a:fillRef>
+          <a:effectRef idx="0">
+            <a:schemeClr val="accent1"/>
+          </a:effectRef>
+          <a:fontRef idx="minor">
+            <a:schemeClr val="lt1"/>
+          </a:fontRef>
+        </p:style>
+        <p:txBody>
+          <a:bodyPr rtlCol="0" anchor="ctr"/>
+          <a:lstStyle/>
+          <a:p>
+            <a:pPr algn="ctr"/>
+            <a:r>
+              <a:rPr lang="en-US" sz="800" dirty="0"/>
+              <a:t>X5</a:t>
+            </a:r>
+          </a:p>
+        </p:txBody>
+      </p:sp>
+      <p:cxnSp>
+        <p:nvCxnSpPr>
+          <p:cNvPr id="66" name="Straight Connector 65">
+            <a:extLst>
+              <a:ext uri="{FF2B5EF4-FFF2-40B4-BE49-F238E27FC236}">
+                <a16:creationId xmlns:a16="http://schemas.microsoft.com/office/drawing/2014/main" id="{177B85CF-4622-754C-A52B-774A9FF7B24C}"/>
+              </a:ext>
+            </a:extLst>
+          </p:cNvPr>
+          <p:cNvCxnSpPr>
+            <a:stCxn id="30" idx="4"/>
+            <a:endCxn id="84" idx="0"/>
+          </p:cNvCxnSpPr>
+          <p:nvPr/>
+        </p:nvCxnSpPr>
+        <p:spPr>
+          <a:xfrm flipH="1">
+            <a:off x="6525958" y="3903409"/>
+            <a:ext cx="297732" cy="875955"/>
+          </a:xfrm>
+          <a:prstGeom prst="line">
+            <a:avLst/>
+          </a:prstGeom>
+          <a:ln w="19050"/>
+        </p:spPr>
+        <p:style>
+          <a:lnRef idx="1">
+            <a:schemeClr val="accent1"/>
+          </a:lnRef>
+          <a:fillRef idx="0">
+            <a:schemeClr val="accent1"/>
+          </a:fillRef>
+          <a:effectRef idx="0">
+            <a:schemeClr val="accent1"/>
+          </a:effectRef>
+          <a:fontRef idx="minor">
+            <a:schemeClr val="tx1"/>
+          </a:fontRef>
+        </p:style>
+      </p:cxnSp>
+      <p:cxnSp>
+        <p:nvCxnSpPr>
+          <p:cNvPr id="72" name="Straight Connector 71">
+            <a:extLst>
+              <a:ext uri="{FF2B5EF4-FFF2-40B4-BE49-F238E27FC236}">
+                <a16:creationId xmlns:a16="http://schemas.microsoft.com/office/drawing/2014/main" id="{D765F4E0-15CC-B246-8FA8-0DF5FDB19F6A}"/>
+              </a:ext>
+            </a:extLst>
+          </p:cNvPr>
+          <p:cNvCxnSpPr>
+            <a:cxnSpLocks/>
+            <a:stCxn id="84" idx="4"/>
+            <a:endCxn id="37" idx="0"/>
+          </p:cNvCxnSpPr>
+          <p:nvPr/>
+        </p:nvCxnSpPr>
+        <p:spPr>
+          <a:xfrm flipH="1">
+            <a:off x="6357311" y="4962244"/>
+            <a:ext cx="168647" cy="502046"/>
+          </a:xfrm>
+          <a:prstGeom prst="line">
+            <a:avLst/>
+          </a:prstGeom>
+          <a:ln w="19050"/>
+        </p:spPr>
+        <p:style>
+          <a:lnRef idx="1">
+            <a:schemeClr val="accent1"/>
+          </a:lnRef>
+          <a:fillRef idx="0">
+            <a:schemeClr val="accent1"/>
+          </a:fillRef>
+          <a:effectRef idx="0">
+            <a:schemeClr val="accent1"/>
+          </a:effectRef>
+          <a:fontRef idx="minor">
+            <a:schemeClr val="tx1"/>
+          </a:fontRef>
+        </p:style>
+      </p:cxnSp>
+    </p:spTree>
+    <p:extLst>
+      <p:ext uri="{BB962C8B-B14F-4D97-AF65-F5344CB8AC3E}">
+        <p14:creationId xmlns:p14="http://schemas.microsoft.com/office/powerpoint/2010/main" val="1352178022"/>
+      </p:ext>
+    </p:extLst>
+  </p:cSld>
+  <p:clrMapOvr>
+    <a:masterClrMapping/>
+  </p:clrMapOvr>
+</p:sld>
+</file>
+
+<file path=ppt/slides/slide4.xml><?xml version="1.0" encoding="utf-8"?>
+<p:sld xmlns:a="http://schemas.openxmlformats.org/drawingml/2006/main" xmlns:r="http://schemas.openxmlformats.org/officeDocument/2006/relationships" xmlns:p="http://schemas.openxmlformats.org/presentationml/2006/main">
+  <p:cSld>
+    <p:spTree>
+      <p:nvGrpSpPr>
+        <p:cNvPr id="1" name=""/>
+        <p:cNvGrpSpPr/>
+        <p:nvPr/>
+      </p:nvGrpSpPr>
+      <p:grpSpPr>
+        <a:xfrm>
+          <a:off x="0" y="0"/>
+          <a:ext cx="0" cy="0"/>
+          <a:chOff x="0" y="0"/>
+          <a:chExt cx="0" cy="0"/>
+        </a:xfrm>
+      </p:grpSpPr>
+      <p:pic>
+        <p:nvPicPr>
           <p:cNvPr id="100" name="Picture 99" descr="A close up of a map&#10;&#10;Description automatically generated">
             <a:extLst>
               <a:ext uri="{FF2B5EF4-FFF2-40B4-BE49-F238E27FC236}">
@@ -10377,7 +13674,7 @@
 </p:sld>
 </file>
 
-<file path=ppt/slides/slide4.xml><?xml version="1.0" encoding="utf-8"?>
+<file path=ppt/slides/slide5.xml><?xml version="1.0" encoding="utf-8"?>
 <p:sld xmlns:a="http://schemas.openxmlformats.org/drawingml/2006/main" xmlns:r="http://schemas.openxmlformats.org/officeDocument/2006/relationships" xmlns:p="http://schemas.openxmlformats.org/presentationml/2006/main">
   <p:cSld>
     <p:spTree>
@@ -14314,7 +17611,7 @@
 </p:sld>
 </file>
 
-<file path=ppt/slides/slide5.xml><?xml version="1.0" encoding="utf-8"?>
+<file path=ppt/slides/slide6.xml><?xml version="1.0" encoding="utf-8"?>
 <p:sld xmlns:a="http://schemas.openxmlformats.org/drawingml/2006/main" xmlns:r="http://schemas.openxmlformats.org/officeDocument/2006/relationships" xmlns:p="http://schemas.openxmlformats.org/presentationml/2006/main">
   <p:cSld>
     <p:spTree>
@@ -18230,7 +21527,7 @@
 </p:sld>
 </file>
 
-<file path=ppt/slides/slide6.xml><?xml version="1.0" encoding="utf-8"?>
+<file path=ppt/slides/slide7.xml><?xml version="1.0" encoding="utf-8"?>
 <p:sld xmlns:a="http://schemas.openxmlformats.org/drawingml/2006/main" xmlns:r="http://schemas.openxmlformats.org/officeDocument/2006/relationships" xmlns:p="http://schemas.openxmlformats.org/presentationml/2006/main">
   <p:cSld>
     <p:spTree>
@@ -20738,7 +24035,7 @@
 </p:sld>
 </file>
 
-<file path=ppt/slides/slide7.xml><?xml version="1.0" encoding="utf-8"?>
+<file path=ppt/slides/slide8.xml><?xml version="1.0" encoding="utf-8"?>
 <p:sld xmlns:a="http://schemas.openxmlformats.org/drawingml/2006/main" xmlns:r="http://schemas.openxmlformats.org/officeDocument/2006/relationships" xmlns:p="http://schemas.openxmlformats.org/presentationml/2006/main">
   <p:cSld>
     <p:spTree>

</xml_diff>